<commit_message>
remove old version of poster
</commit_message>
<xml_diff>
--- a/report/poster.pptx
+++ b/report/poster.pptx
@@ -1,19 +1,114 @@
 
 <file path=ppt/presentation.xml><?xml version="1.0" encoding="utf-8"?>
-<p:presentation xmlns:a="http://schemas.openxmlformats.org/drawingml/2006/main" xmlns:p="http://schemas.openxmlformats.org/presentationml/2006/main" xmlns:r="http://schemas.openxmlformats.org/officeDocument/2006/relationships" xmlns:p14="http://schemas.microsoft.com/office/powerpoint/2010/main" xmlns:p15="http://schemas.microsoft.com/office/powerpoint/2012/main" xmlns:mc="http://schemas.openxmlformats.org/markup-compatibility/2006">
+<p:presentation xmlns:a="http://schemas.openxmlformats.org/drawingml/2006/main" xmlns:r="http://schemas.openxmlformats.org/officeDocument/2006/relationships" xmlns:p="http://schemas.openxmlformats.org/presentationml/2006/main">
   <p:sldMasterIdLst>
-    <p:sldMasterId id="2147483648" r:id="rId2"/>
+    <p:sldMasterId id="2147483648" r:id="rId1"/>
   </p:sldMasterIdLst>
   <p:sldIdLst>
-    <p:sldId id="256" r:id="rId3"/>
+    <p:sldId id="256" r:id="rId2"/>
   </p:sldIdLst>
   <p:sldSz cx="15119350" cy="21383625"/>
-  <p:notesSz cx="7559675" cy="10691812"/>
+  <p:notesSz cx="7559675" cy="10691813"/>
+  <p:defaultTextStyle>
+    <a:defPPr>
+      <a:defRPr lang="fr-FR"/>
+    </a:defPPr>
+    <a:lvl1pPr marL="0" algn="l" defTabSz="914400" rtl="0" eaLnBrk="1" latinLnBrk="0" hangingPunct="1">
+      <a:defRPr sz="1800" kern="1200">
+        <a:solidFill>
+          <a:schemeClr val="tx1"/>
+        </a:solidFill>
+        <a:latin typeface="+mn-lt"/>
+        <a:ea typeface="+mn-ea"/>
+        <a:cs typeface="+mn-cs"/>
+      </a:defRPr>
+    </a:lvl1pPr>
+    <a:lvl2pPr marL="457200" algn="l" defTabSz="914400" rtl="0" eaLnBrk="1" latinLnBrk="0" hangingPunct="1">
+      <a:defRPr sz="1800" kern="1200">
+        <a:solidFill>
+          <a:schemeClr val="tx1"/>
+        </a:solidFill>
+        <a:latin typeface="+mn-lt"/>
+        <a:ea typeface="+mn-ea"/>
+        <a:cs typeface="+mn-cs"/>
+      </a:defRPr>
+    </a:lvl2pPr>
+    <a:lvl3pPr marL="914400" algn="l" defTabSz="914400" rtl="0" eaLnBrk="1" latinLnBrk="0" hangingPunct="1">
+      <a:defRPr sz="1800" kern="1200">
+        <a:solidFill>
+          <a:schemeClr val="tx1"/>
+        </a:solidFill>
+        <a:latin typeface="+mn-lt"/>
+        <a:ea typeface="+mn-ea"/>
+        <a:cs typeface="+mn-cs"/>
+      </a:defRPr>
+    </a:lvl3pPr>
+    <a:lvl4pPr marL="1371600" algn="l" defTabSz="914400" rtl="0" eaLnBrk="1" latinLnBrk="0" hangingPunct="1">
+      <a:defRPr sz="1800" kern="1200">
+        <a:solidFill>
+          <a:schemeClr val="tx1"/>
+        </a:solidFill>
+        <a:latin typeface="+mn-lt"/>
+        <a:ea typeface="+mn-ea"/>
+        <a:cs typeface="+mn-cs"/>
+      </a:defRPr>
+    </a:lvl4pPr>
+    <a:lvl5pPr marL="1828800" algn="l" defTabSz="914400" rtl="0" eaLnBrk="1" latinLnBrk="0" hangingPunct="1">
+      <a:defRPr sz="1800" kern="1200">
+        <a:solidFill>
+          <a:schemeClr val="tx1"/>
+        </a:solidFill>
+        <a:latin typeface="+mn-lt"/>
+        <a:ea typeface="+mn-ea"/>
+        <a:cs typeface="+mn-cs"/>
+      </a:defRPr>
+    </a:lvl5pPr>
+    <a:lvl6pPr marL="2286000" algn="l" defTabSz="914400" rtl="0" eaLnBrk="1" latinLnBrk="0" hangingPunct="1">
+      <a:defRPr sz="1800" kern="1200">
+        <a:solidFill>
+          <a:schemeClr val="tx1"/>
+        </a:solidFill>
+        <a:latin typeface="+mn-lt"/>
+        <a:ea typeface="+mn-ea"/>
+        <a:cs typeface="+mn-cs"/>
+      </a:defRPr>
+    </a:lvl6pPr>
+    <a:lvl7pPr marL="2743200" algn="l" defTabSz="914400" rtl="0" eaLnBrk="1" latinLnBrk="0" hangingPunct="1">
+      <a:defRPr sz="1800" kern="1200">
+        <a:solidFill>
+          <a:schemeClr val="tx1"/>
+        </a:solidFill>
+        <a:latin typeface="+mn-lt"/>
+        <a:ea typeface="+mn-ea"/>
+        <a:cs typeface="+mn-cs"/>
+      </a:defRPr>
+    </a:lvl7pPr>
+    <a:lvl8pPr marL="3200400" algn="l" defTabSz="914400" rtl="0" eaLnBrk="1" latinLnBrk="0" hangingPunct="1">
+      <a:defRPr sz="1800" kern="1200">
+        <a:solidFill>
+          <a:schemeClr val="tx1"/>
+        </a:solidFill>
+        <a:latin typeface="+mn-lt"/>
+        <a:ea typeface="+mn-ea"/>
+        <a:cs typeface="+mn-cs"/>
+      </a:defRPr>
+    </a:lvl8pPr>
+    <a:lvl9pPr marL="3657600" algn="l" defTabSz="914400" rtl="0" eaLnBrk="1" latinLnBrk="0" hangingPunct="1">
+      <a:defRPr sz="1800" kern="1200">
+        <a:solidFill>
+          <a:schemeClr val="tx1"/>
+        </a:solidFill>
+        <a:latin typeface="+mn-lt"/>
+        <a:ea typeface="+mn-ea"/>
+        <a:cs typeface="+mn-cs"/>
+      </a:defRPr>
+    </a:lvl9pPr>
+  </p:defaultTextStyle>
 </p:presentation>
 </file>
 
 <file path=ppt/slideLayouts/slideLayout1.xml><?xml version="1.0" encoding="utf-8"?>
-<p:sldLayout xmlns:a="http://schemas.openxmlformats.org/drawingml/2006/main" xmlns:p="http://schemas.openxmlformats.org/presentationml/2006/main" xmlns:r="http://schemas.openxmlformats.org/officeDocument/2006/relationships" xmlns:p14="http://schemas.microsoft.com/office/powerpoint/2010/main" xmlns:p15="http://schemas.microsoft.com/office/powerpoint/2012/main" xmlns:mc="http://schemas.openxmlformats.org/markup-compatibility/2006" type="blank" preserve="1">
+<p:sldLayout xmlns:a="http://schemas.openxmlformats.org/drawingml/2006/main" xmlns:r="http://schemas.openxmlformats.org/officeDocument/2006/relationships" xmlns:p="http://schemas.openxmlformats.org/presentationml/2006/main" type="blank" preserve="1">
   <p:cSld name="Blank Slide">
     <p:spTree>
       <p:nvGrpSpPr>
@@ -31,11 +126,14 @@
       </p:grpSpPr>
     </p:spTree>
   </p:cSld>
+  <p:clrMapOvr>
+    <a:masterClrMapping/>
+  </p:clrMapOvr>
 </p:sldLayout>
 </file>
 
 <file path=ppt/slideLayouts/slideLayout10.xml><?xml version="1.0" encoding="utf-8"?>
-<p:sldLayout xmlns:a="http://schemas.openxmlformats.org/drawingml/2006/main" xmlns:p="http://schemas.openxmlformats.org/presentationml/2006/main" xmlns:r="http://schemas.openxmlformats.org/officeDocument/2006/relationships" xmlns:p14="http://schemas.microsoft.com/office/powerpoint/2010/main" xmlns:p15="http://schemas.microsoft.com/office/powerpoint/2012/main" xmlns:mc="http://schemas.openxmlformats.org/markup-compatibility/2006" type="objOverTx" preserve="1">
+<p:sldLayout xmlns:a="http://schemas.openxmlformats.org/drawingml/2006/main" xmlns:r="http://schemas.openxmlformats.org/officeDocument/2006/relationships" xmlns:p="http://schemas.openxmlformats.org/presentationml/2006/main" type="objOverTx" preserve="1">
   <p:cSld name="Title, Content over Content">
     <p:spTree>
       <p:nvGrpSpPr>
@@ -71,16 +169,17 @@
           </a:prstGeom>
         </p:spPr>
         <p:txBody>
-          <a:bodyPr lIns="0" rIns="0" tIns="0" bIns="0" anchor="ctr"/>
+          <a:bodyPr lIns="0" tIns="0" rIns="0" bIns="0" anchor="ctr"/>
+          <a:lstStyle/>
           <a:p>
             <a:pPr algn="ctr"/>
-            <a:endParaRPr b="0" lang="fr-CH" sz="12440" spc="-1" strike="noStrike">
+            <a:endParaRPr lang="fr-CH" sz="12440" b="0" strike="noStrike" spc="-1">
               <a:solidFill>
-                <a:srgbClr val="ffffff"/>
+                <a:srgbClr val="FFFFFF"/>
               </a:solidFill>
               <a:uFill>
                 <a:solidFill>
-                  <a:srgbClr val="ffffff"/>
+                  <a:srgbClr val="FFFFFF"/>
                 </a:solidFill>
               </a:uFill>
               <a:latin typeface="Arial"/>
@@ -108,17 +207,18 @@
           </a:prstGeom>
         </p:spPr>
         <p:txBody>
-          <a:bodyPr lIns="0" rIns="0" tIns="0" bIns="0">
+          <a:bodyPr lIns="0" tIns="0" rIns="0" bIns="0">
             <a:normAutofit/>
           </a:bodyPr>
-          <a:p>
-            <a:endParaRPr b="0" lang="fr-CH" sz="9040" spc="-1" strike="noStrike">
+          <a:lstStyle/>
+          <a:p>
+            <a:endParaRPr lang="fr-CH" sz="9040" b="0" strike="noStrike" spc="-1">
               <a:solidFill>
-                <a:srgbClr val="ffffff"/>
+                <a:srgbClr val="FFFFFF"/>
               </a:solidFill>
               <a:uFill>
                 <a:solidFill>
-                  <a:srgbClr val="ffffff"/>
+                  <a:srgbClr val="FFFFFF"/>
                 </a:solidFill>
               </a:uFill>
               <a:latin typeface="Arial"/>
@@ -146,17 +246,18 @@
           </a:prstGeom>
         </p:spPr>
         <p:txBody>
-          <a:bodyPr lIns="0" rIns="0" tIns="0" bIns="0">
+          <a:bodyPr lIns="0" tIns="0" rIns="0" bIns="0">
             <a:normAutofit/>
           </a:bodyPr>
-          <a:p>
-            <a:endParaRPr b="0" lang="fr-CH" sz="9040" spc="-1" strike="noStrike">
+          <a:lstStyle/>
+          <a:p>
+            <a:endParaRPr lang="fr-CH" sz="9040" b="0" strike="noStrike" spc="-1">
               <a:solidFill>
-                <a:srgbClr val="ffffff"/>
+                <a:srgbClr val="FFFFFF"/>
               </a:solidFill>
               <a:uFill>
                 <a:solidFill>
-                  <a:srgbClr val="ffffff"/>
+                  <a:srgbClr val="FFFFFF"/>
                 </a:solidFill>
               </a:uFill>
               <a:latin typeface="Arial"/>
@@ -166,11 +267,14 @@
       </p:sp>
     </p:spTree>
   </p:cSld>
+  <p:clrMapOvr>
+    <a:masterClrMapping/>
+  </p:clrMapOvr>
 </p:sldLayout>
 </file>
 
 <file path=ppt/slideLayouts/slideLayout11.xml><?xml version="1.0" encoding="utf-8"?>
-<p:sldLayout xmlns:a="http://schemas.openxmlformats.org/drawingml/2006/main" xmlns:p="http://schemas.openxmlformats.org/presentationml/2006/main" xmlns:r="http://schemas.openxmlformats.org/officeDocument/2006/relationships" xmlns:p14="http://schemas.microsoft.com/office/powerpoint/2010/main" xmlns:p15="http://schemas.microsoft.com/office/powerpoint/2012/main" xmlns:mc="http://schemas.openxmlformats.org/markup-compatibility/2006" type="fourObj" preserve="1">
+<p:sldLayout xmlns:a="http://schemas.openxmlformats.org/drawingml/2006/main" xmlns:r="http://schemas.openxmlformats.org/officeDocument/2006/relationships" xmlns:p="http://schemas.openxmlformats.org/presentationml/2006/main" type="fourObj" preserve="1">
   <p:cSld name="Title, 4 Content">
     <p:spTree>
       <p:nvGrpSpPr>
@@ -206,16 +310,17 @@
           </a:prstGeom>
         </p:spPr>
         <p:txBody>
-          <a:bodyPr lIns="0" rIns="0" tIns="0" bIns="0" anchor="ctr"/>
+          <a:bodyPr lIns="0" tIns="0" rIns="0" bIns="0" anchor="ctr"/>
+          <a:lstStyle/>
           <a:p>
             <a:pPr algn="ctr"/>
-            <a:endParaRPr b="0" lang="fr-CH" sz="12440" spc="-1" strike="noStrike">
+            <a:endParaRPr lang="fr-CH" sz="12440" b="0" strike="noStrike" spc="-1">
               <a:solidFill>
-                <a:srgbClr val="ffffff"/>
+                <a:srgbClr val="FFFFFF"/>
               </a:solidFill>
               <a:uFill>
                 <a:solidFill>
-                  <a:srgbClr val="ffffff"/>
+                  <a:srgbClr val="FFFFFF"/>
                 </a:solidFill>
               </a:uFill>
               <a:latin typeface="Arial"/>
@@ -243,17 +348,18 @@
           </a:prstGeom>
         </p:spPr>
         <p:txBody>
-          <a:bodyPr lIns="0" rIns="0" tIns="0" bIns="0">
+          <a:bodyPr lIns="0" tIns="0" rIns="0" bIns="0">
             <a:normAutofit/>
           </a:bodyPr>
-          <a:p>
-            <a:endParaRPr b="0" lang="fr-CH" sz="9040" spc="-1" strike="noStrike">
+          <a:lstStyle/>
+          <a:p>
+            <a:endParaRPr lang="fr-CH" sz="9040" b="0" strike="noStrike" spc="-1">
               <a:solidFill>
-                <a:srgbClr val="ffffff"/>
+                <a:srgbClr val="FFFFFF"/>
               </a:solidFill>
               <a:uFill>
                 <a:solidFill>
-                  <a:srgbClr val="ffffff"/>
+                  <a:srgbClr val="FFFFFF"/>
                 </a:solidFill>
               </a:uFill>
               <a:latin typeface="Arial"/>
@@ -281,17 +387,18 @@
           </a:prstGeom>
         </p:spPr>
         <p:txBody>
-          <a:bodyPr lIns="0" rIns="0" tIns="0" bIns="0">
+          <a:bodyPr lIns="0" tIns="0" rIns="0" bIns="0">
             <a:normAutofit/>
           </a:bodyPr>
-          <a:p>
-            <a:endParaRPr b="0" lang="fr-CH" sz="9040" spc="-1" strike="noStrike">
+          <a:lstStyle/>
+          <a:p>
+            <a:endParaRPr lang="fr-CH" sz="9040" b="0" strike="noStrike" spc="-1">
               <a:solidFill>
-                <a:srgbClr val="ffffff"/>
+                <a:srgbClr val="FFFFFF"/>
               </a:solidFill>
               <a:uFill>
                 <a:solidFill>
-                  <a:srgbClr val="ffffff"/>
+                  <a:srgbClr val="FFFFFF"/>
                 </a:solidFill>
               </a:uFill>
               <a:latin typeface="Arial"/>
@@ -319,17 +426,18 @@
           </a:prstGeom>
         </p:spPr>
         <p:txBody>
-          <a:bodyPr lIns="0" rIns="0" tIns="0" bIns="0">
+          <a:bodyPr lIns="0" tIns="0" rIns="0" bIns="0">
             <a:normAutofit/>
           </a:bodyPr>
-          <a:p>
-            <a:endParaRPr b="0" lang="fr-CH" sz="9040" spc="-1" strike="noStrike">
+          <a:lstStyle/>
+          <a:p>
+            <a:endParaRPr lang="fr-CH" sz="9040" b="0" strike="noStrike" spc="-1">
               <a:solidFill>
-                <a:srgbClr val="ffffff"/>
+                <a:srgbClr val="FFFFFF"/>
               </a:solidFill>
               <a:uFill>
                 <a:solidFill>
-                  <a:srgbClr val="ffffff"/>
+                  <a:srgbClr val="FFFFFF"/>
                 </a:solidFill>
               </a:uFill>
               <a:latin typeface="Arial"/>
@@ -357,17 +465,18 @@
           </a:prstGeom>
         </p:spPr>
         <p:txBody>
-          <a:bodyPr lIns="0" rIns="0" tIns="0" bIns="0">
+          <a:bodyPr lIns="0" tIns="0" rIns="0" bIns="0">
             <a:normAutofit/>
           </a:bodyPr>
-          <a:p>
-            <a:endParaRPr b="0" lang="fr-CH" sz="9040" spc="-1" strike="noStrike">
+          <a:lstStyle/>
+          <a:p>
+            <a:endParaRPr lang="fr-CH" sz="9040" b="0" strike="noStrike" spc="-1">
               <a:solidFill>
-                <a:srgbClr val="ffffff"/>
+                <a:srgbClr val="FFFFFF"/>
               </a:solidFill>
               <a:uFill>
                 <a:solidFill>
-                  <a:srgbClr val="ffffff"/>
+                  <a:srgbClr val="FFFFFF"/>
                 </a:solidFill>
               </a:uFill>
               <a:latin typeface="Arial"/>
@@ -377,11 +486,14 @@
       </p:sp>
     </p:spTree>
   </p:cSld>
+  <p:clrMapOvr>
+    <a:masterClrMapping/>
+  </p:clrMapOvr>
 </p:sldLayout>
 </file>
 
 <file path=ppt/slideLayouts/slideLayout12.xml><?xml version="1.0" encoding="utf-8"?>
-<p:sldLayout xmlns:a="http://schemas.openxmlformats.org/drawingml/2006/main" xmlns:p="http://schemas.openxmlformats.org/presentationml/2006/main" xmlns:r="http://schemas.openxmlformats.org/officeDocument/2006/relationships" xmlns:p14="http://schemas.microsoft.com/office/powerpoint/2010/main" xmlns:p15="http://schemas.microsoft.com/office/powerpoint/2012/main" xmlns:mc="http://schemas.openxmlformats.org/markup-compatibility/2006" type="blank" preserve="1">
+<p:sldLayout xmlns:a="http://schemas.openxmlformats.org/drawingml/2006/main" xmlns:r="http://schemas.openxmlformats.org/officeDocument/2006/relationships" xmlns:p="http://schemas.openxmlformats.org/presentationml/2006/main" type="blank" preserve="1">
   <p:cSld name="Title, 6 Content">
     <p:spTree>
       <p:nvGrpSpPr>
@@ -417,16 +529,17 @@
           </a:prstGeom>
         </p:spPr>
         <p:txBody>
-          <a:bodyPr lIns="0" rIns="0" tIns="0" bIns="0" anchor="ctr"/>
+          <a:bodyPr lIns="0" tIns="0" rIns="0" bIns="0" anchor="ctr"/>
+          <a:lstStyle/>
           <a:p>
             <a:pPr algn="ctr"/>
-            <a:endParaRPr b="0" lang="fr-CH" sz="12440" spc="-1" strike="noStrike">
+            <a:endParaRPr lang="fr-CH" sz="12440" b="0" strike="noStrike" spc="-1">
               <a:solidFill>
-                <a:srgbClr val="ffffff"/>
+                <a:srgbClr val="FFFFFF"/>
               </a:solidFill>
               <a:uFill>
                 <a:solidFill>
-                  <a:srgbClr val="ffffff"/>
+                  <a:srgbClr val="FFFFFF"/>
                 </a:solidFill>
               </a:uFill>
               <a:latin typeface="Arial"/>
@@ -454,17 +567,18 @@
           </a:prstGeom>
         </p:spPr>
         <p:txBody>
-          <a:bodyPr lIns="0" rIns="0" tIns="0" bIns="0">
+          <a:bodyPr lIns="0" tIns="0" rIns="0" bIns="0">
             <a:normAutofit/>
           </a:bodyPr>
-          <a:p>
-            <a:endParaRPr b="0" lang="fr-CH" sz="9040" spc="-1" strike="noStrike">
+          <a:lstStyle/>
+          <a:p>
+            <a:endParaRPr lang="fr-CH" sz="9040" b="0" strike="noStrike" spc="-1">
               <a:solidFill>
-                <a:srgbClr val="ffffff"/>
+                <a:srgbClr val="FFFFFF"/>
               </a:solidFill>
               <a:uFill>
                 <a:solidFill>
-                  <a:srgbClr val="ffffff"/>
+                  <a:srgbClr val="FFFFFF"/>
                 </a:solidFill>
               </a:uFill>
               <a:latin typeface="Arial"/>
@@ -492,17 +606,18 @@
           </a:prstGeom>
         </p:spPr>
         <p:txBody>
-          <a:bodyPr lIns="0" rIns="0" tIns="0" bIns="0">
+          <a:bodyPr lIns="0" tIns="0" rIns="0" bIns="0">
             <a:normAutofit/>
           </a:bodyPr>
-          <a:p>
-            <a:endParaRPr b="0" lang="fr-CH" sz="9040" spc="-1" strike="noStrike">
+          <a:lstStyle/>
+          <a:p>
+            <a:endParaRPr lang="fr-CH" sz="9040" b="0" strike="noStrike" spc="-1">
               <a:solidFill>
-                <a:srgbClr val="ffffff"/>
+                <a:srgbClr val="FFFFFF"/>
               </a:solidFill>
               <a:uFill>
                 <a:solidFill>
-                  <a:srgbClr val="ffffff"/>
+                  <a:srgbClr val="FFFFFF"/>
                 </a:solidFill>
               </a:uFill>
               <a:latin typeface="Arial"/>
@@ -530,17 +645,18 @@
           </a:prstGeom>
         </p:spPr>
         <p:txBody>
-          <a:bodyPr lIns="0" rIns="0" tIns="0" bIns="0">
+          <a:bodyPr lIns="0" tIns="0" rIns="0" bIns="0">
             <a:normAutofit/>
           </a:bodyPr>
-          <a:p>
-            <a:endParaRPr b="0" lang="fr-CH" sz="9040" spc="-1" strike="noStrike">
+          <a:lstStyle/>
+          <a:p>
+            <a:endParaRPr lang="fr-CH" sz="9040" b="0" strike="noStrike" spc="-1">
               <a:solidFill>
-                <a:srgbClr val="ffffff"/>
+                <a:srgbClr val="FFFFFF"/>
               </a:solidFill>
               <a:uFill>
                 <a:solidFill>
-                  <a:srgbClr val="ffffff"/>
+                  <a:srgbClr val="FFFFFF"/>
                 </a:solidFill>
               </a:uFill>
               <a:latin typeface="Arial"/>
@@ -568,17 +684,18 @@
           </a:prstGeom>
         </p:spPr>
         <p:txBody>
-          <a:bodyPr lIns="0" rIns="0" tIns="0" bIns="0">
+          <a:bodyPr lIns="0" tIns="0" rIns="0" bIns="0">
             <a:normAutofit/>
           </a:bodyPr>
-          <a:p>
-            <a:endParaRPr b="0" lang="fr-CH" sz="9040" spc="-1" strike="noStrike">
+          <a:lstStyle/>
+          <a:p>
+            <a:endParaRPr lang="fr-CH" sz="9040" b="0" strike="noStrike" spc="-1">
               <a:solidFill>
-                <a:srgbClr val="ffffff"/>
+                <a:srgbClr val="FFFFFF"/>
               </a:solidFill>
               <a:uFill>
                 <a:solidFill>
-                  <a:srgbClr val="ffffff"/>
+                  <a:srgbClr val="FFFFFF"/>
                 </a:solidFill>
               </a:uFill>
               <a:latin typeface="Arial"/>
@@ -606,17 +723,18 @@
           </a:prstGeom>
         </p:spPr>
         <p:txBody>
-          <a:bodyPr lIns="0" rIns="0" tIns="0" bIns="0">
+          <a:bodyPr lIns="0" tIns="0" rIns="0" bIns="0">
             <a:normAutofit/>
           </a:bodyPr>
-          <a:p>
-            <a:endParaRPr b="0" lang="fr-CH" sz="9040" spc="-1" strike="noStrike">
+          <a:lstStyle/>
+          <a:p>
+            <a:endParaRPr lang="fr-CH" sz="9040" b="0" strike="noStrike" spc="-1">
               <a:solidFill>
-                <a:srgbClr val="ffffff"/>
+                <a:srgbClr val="FFFFFF"/>
               </a:solidFill>
               <a:uFill>
                 <a:solidFill>
-                  <a:srgbClr val="ffffff"/>
+                  <a:srgbClr val="FFFFFF"/>
                 </a:solidFill>
               </a:uFill>
               <a:latin typeface="Arial"/>
@@ -644,17 +762,18 @@
           </a:prstGeom>
         </p:spPr>
         <p:txBody>
-          <a:bodyPr lIns="0" rIns="0" tIns="0" bIns="0">
+          <a:bodyPr lIns="0" tIns="0" rIns="0" bIns="0">
             <a:normAutofit/>
           </a:bodyPr>
-          <a:p>
-            <a:endParaRPr b="0" lang="fr-CH" sz="9040" spc="-1" strike="noStrike">
+          <a:lstStyle/>
+          <a:p>
+            <a:endParaRPr lang="fr-CH" sz="9040" b="0" strike="noStrike" spc="-1">
               <a:solidFill>
-                <a:srgbClr val="ffffff"/>
+                <a:srgbClr val="FFFFFF"/>
               </a:solidFill>
               <a:uFill>
                 <a:solidFill>
-                  <a:srgbClr val="ffffff"/>
+                  <a:srgbClr val="FFFFFF"/>
                 </a:solidFill>
               </a:uFill>
               <a:latin typeface="Arial"/>
@@ -664,11 +783,14 @@
       </p:sp>
     </p:spTree>
   </p:cSld>
+  <p:clrMapOvr>
+    <a:masterClrMapping/>
+  </p:clrMapOvr>
 </p:sldLayout>
 </file>
 
 <file path=ppt/slideLayouts/slideLayout2.xml><?xml version="1.0" encoding="utf-8"?>
-<p:sldLayout xmlns:a="http://schemas.openxmlformats.org/drawingml/2006/main" xmlns:p="http://schemas.openxmlformats.org/presentationml/2006/main" xmlns:r="http://schemas.openxmlformats.org/officeDocument/2006/relationships" xmlns:p14="http://schemas.microsoft.com/office/powerpoint/2010/main" xmlns:p15="http://schemas.microsoft.com/office/powerpoint/2012/main" xmlns:mc="http://schemas.openxmlformats.org/markup-compatibility/2006" type="tx" preserve="1">
+<p:sldLayout xmlns:a="http://schemas.openxmlformats.org/drawingml/2006/main" xmlns:r="http://schemas.openxmlformats.org/officeDocument/2006/relationships" xmlns:p="http://schemas.openxmlformats.org/presentationml/2006/main" type="tx" preserve="1">
   <p:cSld name="Title Slide">
     <p:spTree>
       <p:nvGrpSpPr>
@@ -704,16 +826,17 @@
           </a:prstGeom>
         </p:spPr>
         <p:txBody>
-          <a:bodyPr lIns="0" rIns="0" tIns="0" bIns="0" anchor="ctr"/>
+          <a:bodyPr lIns="0" tIns="0" rIns="0" bIns="0" anchor="ctr"/>
+          <a:lstStyle/>
           <a:p>
             <a:pPr algn="ctr"/>
-            <a:endParaRPr b="0" lang="fr-CH" sz="12440" spc="-1" strike="noStrike">
+            <a:endParaRPr lang="fr-CH" sz="12440" b="0" strike="noStrike" spc="-1">
               <a:solidFill>
-                <a:srgbClr val="ffffff"/>
+                <a:srgbClr val="FFFFFF"/>
               </a:solidFill>
               <a:uFill>
                 <a:solidFill>
-                  <a:srgbClr val="ffffff"/>
+                  <a:srgbClr val="FFFFFF"/>
                 </a:solidFill>
               </a:uFill>
               <a:latin typeface="Arial"/>
@@ -741,16 +864,17 @@
           </a:prstGeom>
         </p:spPr>
         <p:txBody>
-          <a:bodyPr lIns="0" rIns="0" tIns="0" bIns="0" anchor="ctr"/>
+          <a:bodyPr lIns="0" tIns="0" rIns="0" bIns="0" anchor="ctr"/>
+          <a:lstStyle/>
           <a:p>
             <a:pPr algn="ctr"/>
-            <a:endParaRPr b="0" lang="fr-CH" sz="3200" spc="-1" strike="noStrike">
+            <a:endParaRPr lang="fr-CH" sz="3200" b="0" strike="noStrike" spc="-1">
               <a:solidFill>
-                <a:srgbClr val="ffffff"/>
+                <a:srgbClr val="FFFFFF"/>
               </a:solidFill>
               <a:uFill>
                 <a:solidFill>
-                  <a:srgbClr val="ffffff"/>
+                  <a:srgbClr val="FFFFFF"/>
                 </a:solidFill>
               </a:uFill>
               <a:latin typeface="Arial"/>
@@ -760,11 +884,14 @@
       </p:sp>
     </p:spTree>
   </p:cSld>
+  <p:clrMapOvr>
+    <a:masterClrMapping/>
+  </p:clrMapOvr>
 </p:sldLayout>
 </file>
 
 <file path=ppt/slideLayouts/slideLayout3.xml><?xml version="1.0" encoding="utf-8"?>
-<p:sldLayout xmlns:a="http://schemas.openxmlformats.org/drawingml/2006/main" xmlns:p="http://schemas.openxmlformats.org/presentationml/2006/main" xmlns:r="http://schemas.openxmlformats.org/officeDocument/2006/relationships" xmlns:p14="http://schemas.microsoft.com/office/powerpoint/2010/main" xmlns:p15="http://schemas.microsoft.com/office/powerpoint/2012/main" xmlns:mc="http://schemas.openxmlformats.org/markup-compatibility/2006" type="obj" preserve="1">
+<p:sldLayout xmlns:a="http://schemas.openxmlformats.org/drawingml/2006/main" xmlns:r="http://schemas.openxmlformats.org/officeDocument/2006/relationships" xmlns:p="http://schemas.openxmlformats.org/presentationml/2006/main" type="obj" preserve="1">
   <p:cSld name="Title, Content">
     <p:spTree>
       <p:nvGrpSpPr>
@@ -800,16 +927,17 @@
           </a:prstGeom>
         </p:spPr>
         <p:txBody>
-          <a:bodyPr lIns="0" rIns="0" tIns="0" bIns="0" anchor="ctr"/>
+          <a:bodyPr lIns="0" tIns="0" rIns="0" bIns="0" anchor="ctr"/>
+          <a:lstStyle/>
           <a:p>
             <a:pPr algn="ctr"/>
-            <a:endParaRPr b="0" lang="fr-CH" sz="12440" spc="-1" strike="noStrike">
+            <a:endParaRPr lang="fr-CH" sz="12440" b="0" strike="noStrike" spc="-1">
               <a:solidFill>
-                <a:srgbClr val="ffffff"/>
+                <a:srgbClr val="FFFFFF"/>
               </a:solidFill>
               <a:uFill>
                 <a:solidFill>
-                  <a:srgbClr val="ffffff"/>
+                  <a:srgbClr val="FFFFFF"/>
                 </a:solidFill>
               </a:uFill>
               <a:latin typeface="Arial"/>
@@ -837,17 +965,18 @@
           </a:prstGeom>
         </p:spPr>
         <p:txBody>
-          <a:bodyPr lIns="0" rIns="0" tIns="0" bIns="0">
+          <a:bodyPr lIns="0" tIns="0" rIns="0" bIns="0">
             <a:normAutofit/>
           </a:bodyPr>
-          <a:p>
-            <a:endParaRPr b="0" lang="fr-CH" sz="9040" spc="-1" strike="noStrike">
+          <a:lstStyle/>
+          <a:p>
+            <a:endParaRPr lang="fr-CH" sz="9040" b="0" strike="noStrike" spc="-1">
               <a:solidFill>
-                <a:srgbClr val="ffffff"/>
+                <a:srgbClr val="FFFFFF"/>
               </a:solidFill>
               <a:uFill>
                 <a:solidFill>
-                  <a:srgbClr val="ffffff"/>
+                  <a:srgbClr val="FFFFFF"/>
                 </a:solidFill>
               </a:uFill>
               <a:latin typeface="Arial"/>
@@ -857,11 +986,14 @@
       </p:sp>
     </p:spTree>
   </p:cSld>
+  <p:clrMapOvr>
+    <a:masterClrMapping/>
+  </p:clrMapOvr>
 </p:sldLayout>
 </file>
 
 <file path=ppt/slideLayouts/slideLayout4.xml><?xml version="1.0" encoding="utf-8"?>
-<p:sldLayout xmlns:a="http://schemas.openxmlformats.org/drawingml/2006/main" xmlns:p="http://schemas.openxmlformats.org/presentationml/2006/main" xmlns:r="http://schemas.openxmlformats.org/officeDocument/2006/relationships" xmlns:p14="http://schemas.microsoft.com/office/powerpoint/2010/main" xmlns:p15="http://schemas.microsoft.com/office/powerpoint/2012/main" xmlns:mc="http://schemas.openxmlformats.org/markup-compatibility/2006" type="twoObj" preserve="1">
+<p:sldLayout xmlns:a="http://schemas.openxmlformats.org/drawingml/2006/main" xmlns:r="http://schemas.openxmlformats.org/officeDocument/2006/relationships" xmlns:p="http://schemas.openxmlformats.org/presentationml/2006/main" type="twoObj" preserve="1">
   <p:cSld name="Title, 2 Content">
     <p:spTree>
       <p:nvGrpSpPr>
@@ -897,16 +1029,17 @@
           </a:prstGeom>
         </p:spPr>
         <p:txBody>
-          <a:bodyPr lIns="0" rIns="0" tIns="0" bIns="0" anchor="ctr"/>
+          <a:bodyPr lIns="0" tIns="0" rIns="0" bIns="0" anchor="ctr"/>
+          <a:lstStyle/>
           <a:p>
             <a:pPr algn="ctr"/>
-            <a:endParaRPr b="0" lang="fr-CH" sz="12440" spc="-1" strike="noStrike">
+            <a:endParaRPr lang="fr-CH" sz="12440" b="0" strike="noStrike" spc="-1">
               <a:solidFill>
-                <a:srgbClr val="ffffff"/>
+                <a:srgbClr val="FFFFFF"/>
               </a:solidFill>
               <a:uFill>
                 <a:solidFill>
-                  <a:srgbClr val="ffffff"/>
+                  <a:srgbClr val="FFFFFF"/>
                 </a:solidFill>
               </a:uFill>
               <a:latin typeface="Arial"/>
@@ -934,17 +1067,18 @@
           </a:prstGeom>
         </p:spPr>
         <p:txBody>
-          <a:bodyPr lIns="0" rIns="0" tIns="0" bIns="0">
+          <a:bodyPr lIns="0" tIns="0" rIns="0" bIns="0">
             <a:normAutofit/>
           </a:bodyPr>
-          <a:p>
-            <a:endParaRPr b="0" lang="fr-CH" sz="9040" spc="-1" strike="noStrike">
+          <a:lstStyle/>
+          <a:p>
+            <a:endParaRPr lang="fr-CH" sz="9040" b="0" strike="noStrike" spc="-1">
               <a:solidFill>
-                <a:srgbClr val="ffffff"/>
+                <a:srgbClr val="FFFFFF"/>
               </a:solidFill>
               <a:uFill>
                 <a:solidFill>
-                  <a:srgbClr val="ffffff"/>
+                  <a:srgbClr val="FFFFFF"/>
                 </a:solidFill>
               </a:uFill>
               <a:latin typeface="Arial"/>
@@ -972,17 +1106,18 @@
           </a:prstGeom>
         </p:spPr>
         <p:txBody>
-          <a:bodyPr lIns="0" rIns="0" tIns="0" bIns="0">
+          <a:bodyPr lIns="0" tIns="0" rIns="0" bIns="0">
             <a:normAutofit/>
           </a:bodyPr>
-          <a:p>
-            <a:endParaRPr b="0" lang="fr-CH" sz="9040" spc="-1" strike="noStrike">
+          <a:lstStyle/>
+          <a:p>
+            <a:endParaRPr lang="fr-CH" sz="9040" b="0" strike="noStrike" spc="-1">
               <a:solidFill>
-                <a:srgbClr val="ffffff"/>
+                <a:srgbClr val="FFFFFF"/>
               </a:solidFill>
               <a:uFill>
                 <a:solidFill>
-                  <a:srgbClr val="ffffff"/>
+                  <a:srgbClr val="FFFFFF"/>
                 </a:solidFill>
               </a:uFill>
               <a:latin typeface="Arial"/>
@@ -992,11 +1127,14 @@
       </p:sp>
     </p:spTree>
   </p:cSld>
+  <p:clrMapOvr>
+    <a:masterClrMapping/>
+  </p:clrMapOvr>
 </p:sldLayout>
 </file>
 
 <file path=ppt/slideLayouts/slideLayout5.xml><?xml version="1.0" encoding="utf-8"?>
-<p:sldLayout xmlns:a="http://schemas.openxmlformats.org/drawingml/2006/main" xmlns:p="http://schemas.openxmlformats.org/presentationml/2006/main" xmlns:r="http://schemas.openxmlformats.org/officeDocument/2006/relationships" xmlns:p14="http://schemas.microsoft.com/office/powerpoint/2010/main" xmlns:p15="http://schemas.microsoft.com/office/powerpoint/2012/main" xmlns:mc="http://schemas.openxmlformats.org/markup-compatibility/2006" type="titleOnly" preserve="1">
+<p:sldLayout xmlns:a="http://schemas.openxmlformats.org/drawingml/2006/main" xmlns:r="http://schemas.openxmlformats.org/officeDocument/2006/relationships" xmlns:p="http://schemas.openxmlformats.org/presentationml/2006/main" type="titleOnly" preserve="1">
   <p:cSld name="Title Only">
     <p:spTree>
       <p:nvGrpSpPr>
@@ -1032,16 +1170,17 @@
           </a:prstGeom>
         </p:spPr>
         <p:txBody>
-          <a:bodyPr lIns="0" rIns="0" tIns="0" bIns="0" anchor="ctr"/>
+          <a:bodyPr lIns="0" tIns="0" rIns="0" bIns="0" anchor="ctr"/>
+          <a:lstStyle/>
           <a:p>
             <a:pPr algn="ctr"/>
-            <a:endParaRPr b="0" lang="fr-CH" sz="12440" spc="-1" strike="noStrike">
+            <a:endParaRPr lang="fr-CH" sz="12440" b="0" strike="noStrike" spc="-1">
               <a:solidFill>
-                <a:srgbClr val="ffffff"/>
+                <a:srgbClr val="FFFFFF"/>
               </a:solidFill>
               <a:uFill>
                 <a:solidFill>
-                  <a:srgbClr val="ffffff"/>
+                  <a:srgbClr val="FFFFFF"/>
                 </a:solidFill>
               </a:uFill>
               <a:latin typeface="Arial"/>
@@ -1051,11 +1190,14 @@
       </p:sp>
     </p:spTree>
   </p:cSld>
+  <p:clrMapOvr>
+    <a:masterClrMapping/>
+  </p:clrMapOvr>
 </p:sldLayout>
 </file>
 
 <file path=ppt/slideLayouts/slideLayout6.xml><?xml version="1.0" encoding="utf-8"?>
-<p:sldLayout xmlns:a="http://schemas.openxmlformats.org/drawingml/2006/main" xmlns:p="http://schemas.openxmlformats.org/presentationml/2006/main" xmlns:r="http://schemas.openxmlformats.org/officeDocument/2006/relationships" xmlns:p14="http://schemas.microsoft.com/office/powerpoint/2010/main" xmlns:p15="http://schemas.microsoft.com/office/powerpoint/2012/main" xmlns:mc="http://schemas.openxmlformats.org/markup-compatibility/2006" type="objOnly" preserve="1">
+<p:sldLayout xmlns:a="http://schemas.openxmlformats.org/drawingml/2006/main" xmlns:r="http://schemas.openxmlformats.org/officeDocument/2006/relationships" xmlns:p="http://schemas.openxmlformats.org/presentationml/2006/main" type="objOnly" preserve="1">
   <p:cSld name="Centered Text">
     <p:spTree>
       <p:nvGrpSpPr>
@@ -1091,16 +1233,17 @@
           </a:prstGeom>
         </p:spPr>
         <p:txBody>
-          <a:bodyPr lIns="0" rIns="0" tIns="0" bIns="0" anchor="ctr"/>
+          <a:bodyPr lIns="0" tIns="0" rIns="0" bIns="0" anchor="ctr"/>
+          <a:lstStyle/>
           <a:p>
             <a:pPr algn="ctr"/>
-            <a:endParaRPr b="0" lang="fr-CH" sz="3200" spc="-1" strike="noStrike">
+            <a:endParaRPr lang="fr-CH" sz="3200" b="0" strike="noStrike" spc="-1">
               <a:solidFill>
-                <a:srgbClr val="ffffff"/>
+                <a:srgbClr val="FFFFFF"/>
               </a:solidFill>
               <a:uFill>
                 <a:solidFill>
-                  <a:srgbClr val="ffffff"/>
+                  <a:srgbClr val="FFFFFF"/>
                 </a:solidFill>
               </a:uFill>
               <a:latin typeface="Arial"/>
@@ -1110,11 +1253,14 @@
       </p:sp>
     </p:spTree>
   </p:cSld>
+  <p:clrMapOvr>
+    <a:masterClrMapping/>
+  </p:clrMapOvr>
 </p:sldLayout>
 </file>
 
 <file path=ppt/slideLayouts/slideLayout7.xml><?xml version="1.0" encoding="utf-8"?>
-<p:sldLayout xmlns:a="http://schemas.openxmlformats.org/drawingml/2006/main" xmlns:p="http://schemas.openxmlformats.org/presentationml/2006/main" xmlns:r="http://schemas.openxmlformats.org/officeDocument/2006/relationships" xmlns:p14="http://schemas.microsoft.com/office/powerpoint/2010/main" xmlns:p15="http://schemas.microsoft.com/office/powerpoint/2012/main" xmlns:mc="http://schemas.openxmlformats.org/markup-compatibility/2006" type="twoObjAndObj" preserve="1">
+<p:sldLayout xmlns:a="http://schemas.openxmlformats.org/drawingml/2006/main" xmlns:r="http://schemas.openxmlformats.org/officeDocument/2006/relationships" xmlns:p="http://schemas.openxmlformats.org/presentationml/2006/main" type="twoObjAndObj" preserve="1">
   <p:cSld name="Title, 2 Content and Content">
     <p:spTree>
       <p:nvGrpSpPr>
@@ -1150,16 +1296,17 @@
           </a:prstGeom>
         </p:spPr>
         <p:txBody>
-          <a:bodyPr lIns="0" rIns="0" tIns="0" bIns="0" anchor="ctr"/>
+          <a:bodyPr lIns="0" tIns="0" rIns="0" bIns="0" anchor="ctr"/>
+          <a:lstStyle/>
           <a:p>
             <a:pPr algn="ctr"/>
-            <a:endParaRPr b="0" lang="fr-CH" sz="12440" spc="-1" strike="noStrike">
+            <a:endParaRPr lang="fr-CH" sz="12440" b="0" strike="noStrike" spc="-1">
               <a:solidFill>
-                <a:srgbClr val="ffffff"/>
+                <a:srgbClr val="FFFFFF"/>
               </a:solidFill>
               <a:uFill>
                 <a:solidFill>
-                  <a:srgbClr val="ffffff"/>
+                  <a:srgbClr val="FFFFFF"/>
                 </a:solidFill>
               </a:uFill>
               <a:latin typeface="Arial"/>
@@ -1187,17 +1334,18 @@
           </a:prstGeom>
         </p:spPr>
         <p:txBody>
-          <a:bodyPr lIns="0" rIns="0" tIns="0" bIns="0">
+          <a:bodyPr lIns="0" tIns="0" rIns="0" bIns="0">
             <a:normAutofit/>
           </a:bodyPr>
-          <a:p>
-            <a:endParaRPr b="0" lang="fr-CH" sz="9040" spc="-1" strike="noStrike">
+          <a:lstStyle/>
+          <a:p>
+            <a:endParaRPr lang="fr-CH" sz="9040" b="0" strike="noStrike" spc="-1">
               <a:solidFill>
-                <a:srgbClr val="ffffff"/>
+                <a:srgbClr val="FFFFFF"/>
               </a:solidFill>
               <a:uFill>
                 <a:solidFill>
-                  <a:srgbClr val="ffffff"/>
+                  <a:srgbClr val="FFFFFF"/>
                 </a:solidFill>
               </a:uFill>
               <a:latin typeface="Arial"/>
@@ -1225,17 +1373,18 @@
           </a:prstGeom>
         </p:spPr>
         <p:txBody>
-          <a:bodyPr lIns="0" rIns="0" tIns="0" bIns="0">
+          <a:bodyPr lIns="0" tIns="0" rIns="0" bIns="0">
             <a:normAutofit/>
           </a:bodyPr>
-          <a:p>
-            <a:endParaRPr b="0" lang="fr-CH" sz="9040" spc="-1" strike="noStrike">
+          <a:lstStyle/>
+          <a:p>
+            <a:endParaRPr lang="fr-CH" sz="9040" b="0" strike="noStrike" spc="-1">
               <a:solidFill>
-                <a:srgbClr val="ffffff"/>
+                <a:srgbClr val="FFFFFF"/>
               </a:solidFill>
               <a:uFill>
                 <a:solidFill>
-                  <a:srgbClr val="ffffff"/>
+                  <a:srgbClr val="FFFFFF"/>
                 </a:solidFill>
               </a:uFill>
               <a:latin typeface="Arial"/>
@@ -1263,17 +1412,18 @@
           </a:prstGeom>
         </p:spPr>
         <p:txBody>
-          <a:bodyPr lIns="0" rIns="0" tIns="0" bIns="0">
+          <a:bodyPr lIns="0" tIns="0" rIns="0" bIns="0">
             <a:normAutofit/>
           </a:bodyPr>
-          <a:p>
-            <a:endParaRPr b="0" lang="fr-CH" sz="9040" spc="-1" strike="noStrike">
+          <a:lstStyle/>
+          <a:p>
+            <a:endParaRPr lang="fr-CH" sz="9040" b="0" strike="noStrike" spc="-1">
               <a:solidFill>
-                <a:srgbClr val="ffffff"/>
+                <a:srgbClr val="FFFFFF"/>
               </a:solidFill>
               <a:uFill>
                 <a:solidFill>
-                  <a:srgbClr val="ffffff"/>
+                  <a:srgbClr val="FFFFFF"/>
                 </a:solidFill>
               </a:uFill>
               <a:latin typeface="Arial"/>
@@ -1283,11 +1433,14 @@
       </p:sp>
     </p:spTree>
   </p:cSld>
+  <p:clrMapOvr>
+    <a:masterClrMapping/>
+  </p:clrMapOvr>
 </p:sldLayout>
 </file>
 
 <file path=ppt/slideLayouts/slideLayout8.xml><?xml version="1.0" encoding="utf-8"?>
-<p:sldLayout xmlns:a="http://schemas.openxmlformats.org/drawingml/2006/main" xmlns:p="http://schemas.openxmlformats.org/presentationml/2006/main" xmlns:r="http://schemas.openxmlformats.org/officeDocument/2006/relationships" xmlns:p14="http://schemas.microsoft.com/office/powerpoint/2010/main" xmlns:p15="http://schemas.microsoft.com/office/powerpoint/2012/main" xmlns:mc="http://schemas.openxmlformats.org/markup-compatibility/2006" type="objAndTwoObj" preserve="1">
+<p:sldLayout xmlns:a="http://schemas.openxmlformats.org/drawingml/2006/main" xmlns:r="http://schemas.openxmlformats.org/officeDocument/2006/relationships" xmlns:p="http://schemas.openxmlformats.org/presentationml/2006/main" type="objAndTwoObj" preserve="1">
   <p:cSld name="Title Content and 2 Content">
     <p:spTree>
       <p:nvGrpSpPr>
@@ -1323,16 +1476,17 @@
           </a:prstGeom>
         </p:spPr>
         <p:txBody>
-          <a:bodyPr lIns="0" rIns="0" tIns="0" bIns="0" anchor="ctr"/>
+          <a:bodyPr lIns="0" tIns="0" rIns="0" bIns="0" anchor="ctr"/>
+          <a:lstStyle/>
           <a:p>
             <a:pPr algn="ctr"/>
-            <a:endParaRPr b="0" lang="fr-CH" sz="12440" spc="-1" strike="noStrike">
+            <a:endParaRPr lang="fr-CH" sz="12440" b="0" strike="noStrike" spc="-1">
               <a:solidFill>
-                <a:srgbClr val="ffffff"/>
+                <a:srgbClr val="FFFFFF"/>
               </a:solidFill>
               <a:uFill>
                 <a:solidFill>
-                  <a:srgbClr val="ffffff"/>
+                  <a:srgbClr val="FFFFFF"/>
                 </a:solidFill>
               </a:uFill>
               <a:latin typeface="Arial"/>
@@ -1360,17 +1514,18 @@
           </a:prstGeom>
         </p:spPr>
         <p:txBody>
-          <a:bodyPr lIns="0" rIns="0" tIns="0" bIns="0">
+          <a:bodyPr lIns="0" tIns="0" rIns="0" bIns="0">
             <a:normAutofit/>
           </a:bodyPr>
-          <a:p>
-            <a:endParaRPr b="0" lang="fr-CH" sz="9040" spc="-1" strike="noStrike">
+          <a:lstStyle/>
+          <a:p>
+            <a:endParaRPr lang="fr-CH" sz="9040" b="0" strike="noStrike" spc="-1">
               <a:solidFill>
-                <a:srgbClr val="ffffff"/>
+                <a:srgbClr val="FFFFFF"/>
               </a:solidFill>
               <a:uFill>
                 <a:solidFill>
-                  <a:srgbClr val="ffffff"/>
+                  <a:srgbClr val="FFFFFF"/>
                 </a:solidFill>
               </a:uFill>
               <a:latin typeface="Arial"/>
@@ -1398,17 +1553,18 @@
           </a:prstGeom>
         </p:spPr>
         <p:txBody>
-          <a:bodyPr lIns="0" rIns="0" tIns="0" bIns="0">
+          <a:bodyPr lIns="0" tIns="0" rIns="0" bIns="0">
             <a:normAutofit/>
           </a:bodyPr>
-          <a:p>
-            <a:endParaRPr b="0" lang="fr-CH" sz="9040" spc="-1" strike="noStrike">
+          <a:lstStyle/>
+          <a:p>
+            <a:endParaRPr lang="fr-CH" sz="9040" b="0" strike="noStrike" spc="-1">
               <a:solidFill>
-                <a:srgbClr val="ffffff"/>
+                <a:srgbClr val="FFFFFF"/>
               </a:solidFill>
               <a:uFill>
                 <a:solidFill>
-                  <a:srgbClr val="ffffff"/>
+                  <a:srgbClr val="FFFFFF"/>
                 </a:solidFill>
               </a:uFill>
               <a:latin typeface="Arial"/>
@@ -1436,17 +1592,18 @@
           </a:prstGeom>
         </p:spPr>
         <p:txBody>
-          <a:bodyPr lIns="0" rIns="0" tIns="0" bIns="0">
+          <a:bodyPr lIns="0" tIns="0" rIns="0" bIns="0">
             <a:normAutofit/>
           </a:bodyPr>
-          <a:p>
-            <a:endParaRPr b="0" lang="fr-CH" sz="9040" spc="-1" strike="noStrike">
+          <a:lstStyle/>
+          <a:p>
+            <a:endParaRPr lang="fr-CH" sz="9040" b="0" strike="noStrike" spc="-1">
               <a:solidFill>
-                <a:srgbClr val="ffffff"/>
+                <a:srgbClr val="FFFFFF"/>
               </a:solidFill>
               <a:uFill>
                 <a:solidFill>
-                  <a:srgbClr val="ffffff"/>
+                  <a:srgbClr val="FFFFFF"/>
                 </a:solidFill>
               </a:uFill>
               <a:latin typeface="Arial"/>
@@ -1456,11 +1613,14 @@
       </p:sp>
     </p:spTree>
   </p:cSld>
+  <p:clrMapOvr>
+    <a:masterClrMapping/>
+  </p:clrMapOvr>
 </p:sldLayout>
 </file>
 
 <file path=ppt/slideLayouts/slideLayout9.xml><?xml version="1.0" encoding="utf-8"?>
-<p:sldLayout xmlns:a="http://schemas.openxmlformats.org/drawingml/2006/main" xmlns:p="http://schemas.openxmlformats.org/presentationml/2006/main" xmlns:r="http://schemas.openxmlformats.org/officeDocument/2006/relationships" xmlns:p14="http://schemas.microsoft.com/office/powerpoint/2010/main" xmlns:p15="http://schemas.microsoft.com/office/powerpoint/2012/main" xmlns:mc="http://schemas.openxmlformats.org/markup-compatibility/2006" type="twoObjOverTx" preserve="1">
+<p:sldLayout xmlns:a="http://schemas.openxmlformats.org/drawingml/2006/main" xmlns:r="http://schemas.openxmlformats.org/officeDocument/2006/relationships" xmlns:p="http://schemas.openxmlformats.org/presentationml/2006/main" type="twoObjOverTx" preserve="1">
   <p:cSld name="Title, 2 Content over Content">
     <p:spTree>
       <p:nvGrpSpPr>
@@ -1496,16 +1656,17 @@
           </a:prstGeom>
         </p:spPr>
         <p:txBody>
-          <a:bodyPr lIns="0" rIns="0" tIns="0" bIns="0" anchor="ctr"/>
+          <a:bodyPr lIns="0" tIns="0" rIns="0" bIns="0" anchor="ctr"/>
+          <a:lstStyle/>
           <a:p>
             <a:pPr algn="ctr"/>
-            <a:endParaRPr b="0" lang="fr-CH" sz="12440" spc="-1" strike="noStrike">
+            <a:endParaRPr lang="fr-CH" sz="12440" b="0" strike="noStrike" spc="-1">
               <a:solidFill>
-                <a:srgbClr val="ffffff"/>
+                <a:srgbClr val="FFFFFF"/>
               </a:solidFill>
               <a:uFill>
                 <a:solidFill>
-                  <a:srgbClr val="ffffff"/>
+                  <a:srgbClr val="FFFFFF"/>
                 </a:solidFill>
               </a:uFill>
               <a:latin typeface="Arial"/>
@@ -1533,17 +1694,18 @@
           </a:prstGeom>
         </p:spPr>
         <p:txBody>
-          <a:bodyPr lIns="0" rIns="0" tIns="0" bIns="0">
+          <a:bodyPr lIns="0" tIns="0" rIns="0" bIns="0">
             <a:normAutofit/>
           </a:bodyPr>
-          <a:p>
-            <a:endParaRPr b="0" lang="fr-CH" sz="9040" spc="-1" strike="noStrike">
+          <a:lstStyle/>
+          <a:p>
+            <a:endParaRPr lang="fr-CH" sz="9040" b="0" strike="noStrike" spc="-1">
               <a:solidFill>
-                <a:srgbClr val="ffffff"/>
+                <a:srgbClr val="FFFFFF"/>
               </a:solidFill>
               <a:uFill>
                 <a:solidFill>
-                  <a:srgbClr val="ffffff"/>
+                  <a:srgbClr val="FFFFFF"/>
                 </a:solidFill>
               </a:uFill>
               <a:latin typeface="Arial"/>
@@ -1571,17 +1733,18 @@
           </a:prstGeom>
         </p:spPr>
         <p:txBody>
-          <a:bodyPr lIns="0" rIns="0" tIns="0" bIns="0">
+          <a:bodyPr lIns="0" tIns="0" rIns="0" bIns="0">
             <a:normAutofit/>
           </a:bodyPr>
-          <a:p>
-            <a:endParaRPr b="0" lang="fr-CH" sz="9040" spc="-1" strike="noStrike">
+          <a:lstStyle/>
+          <a:p>
+            <a:endParaRPr lang="fr-CH" sz="9040" b="0" strike="noStrike" spc="-1">
               <a:solidFill>
-                <a:srgbClr val="ffffff"/>
+                <a:srgbClr val="FFFFFF"/>
               </a:solidFill>
               <a:uFill>
                 <a:solidFill>
-                  <a:srgbClr val="ffffff"/>
+                  <a:srgbClr val="FFFFFF"/>
                 </a:solidFill>
               </a:uFill>
               <a:latin typeface="Arial"/>
@@ -1609,17 +1772,18 @@
           </a:prstGeom>
         </p:spPr>
         <p:txBody>
-          <a:bodyPr lIns="0" rIns="0" tIns="0" bIns="0">
+          <a:bodyPr lIns="0" tIns="0" rIns="0" bIns="0">
             <a:normAutofit/>
           </a:bodyPr>
-          <a:p>
-            <a:endParaRPr b="0" lang="fr-CH" sz="9040" spc="-1" strike="noStrike">
+          <a:lstStyle/>
+          <a:p>
+            <a:endParaRPr lang="fr-CH" sz="9040" b="0" strike="noStrike" spc="-1">
               <a:solidFill>
-                <a:srgbClr val="ffffff"/>
+                <a:srgbClr val="FFFFFF"/>
               </a:solidFill>
               <a:uFill>
                 <a:solidFill>
-                  <a:srgbClr val="ffffff"/>
+                  <a:srgbClr val="FFFFFF"/>
                 </a:solidFill>
               </a:uFill>
               <a:latin typeface="Arial"/>
@@ -1629,17 +1793,21 @@
       </p:sp>
     </p:spTree>
   </p:cSld>
+  <p:clrMapOvr>
+    <a:masterClrMapping/>
+  </p:clrMapOvr>
 </p:sldLayout>
 </file>
 
 <file path=ppt/slideMasters/slideMaster1.xml><?xml version="1.0" encoding="utf-8"?>
-<p:sldMaster xmlns:a="http://schemas.openxmlformats.org/drawingml/2006/main" xmlns:p="http://schemas.openxmlformats.org/presentationml/2006/main" xmlns:r="http://schemas.openxmlformats.org/officeDocument/2006/relationships" xmlns:p14="http://schemas.microsoft.com/office/powerpoint/2010/main" xmlns:p15="http://schemas.microsoft.com/office/powerpoint/2012/main" xmlns:mc="http://schemas.openxmlformats.org/markup-compatibility/2006">
+<p:sldMaster xmlns:a="http://schemas.openxmlformats.org/drawingml/2006/main" xmlns:r="http://schemas.openxmlformats.org/officeDocument/2006/relationships" xmlns:p="http://schemas.openxmlformats.org/presentationml/2006/main">
   <p:cSld>
     <p:bg>
       <p:bgPr>
         <a:solidFill>
-          <a:srgbClr val="1b1b1b"/>
+          <a:srgbClr val="1B1B1B"/>
         </a:solidFill>
+        <a:effectLst/>
       </p:bgPr>
     </p:bg>
     <p:spTree>
@@ -1658,7 +1826,7 @@
       </p:grpSpPr>
       <p:sp>
         <p:nvSpPr>
-          <p:cNvPr id="0" name="PlaceHolder 1"/>
+          <p:cNvPr id="5" name="PlaceHolder 1"/>
           <p:cNvSpPr>
             <a:spLocks noGrp="1"/>
           </p:cNvSpPr>
@@ -1676,40 +1844,30 @@
           </a:prstGeom>
         </p:spPr>
         <p:txBody>
-          <a:bodyPr lIns="0" rIns="0" tIns="0" bIns="0" anchor="ctr"/>
+          <a:bodyPr lIns="0" tIns="0" rIns="0" bIns="0" anchor="ctr"/>
+          <a:lstStyle/>
           <a:p>
             <a:pPr algn="ctr"/>
             <a:r>
-              <a:rPr b="0" lang="fr-CH" sz="12440" spc="-1" strike="noStrike">
-                <a:solidFill>
-                  <a:srgbClr val="ffffff"/>
-                </a:solidFill>
-                <a:uFill>
-                  <a:solidFill>
-                    <a:srgbClr val="ffffff"/>
+              <a:rPr lang="fr-CH" sz="12440" b="0" strike="noStrike" spc="-1">
+                <a:solidFill>
+                  <a:srgbClr val="FFFFFF"/>
+                </a:solidFill>
+                <a:uFill>
+                  <a:solidFill>
+                    <a:srgbClr val="FFFFFF"/>
                   </a:solidFill>
                 </a:uFill>
                 <a:latin typeface="Arial"/>
               </a:rPr>
               <a:t>Cliquez pour éditer le format du texte-titre</a:t>
             </a:r>
-            <a:endParaRPr b="0" lang="fr-CH" sz="12440" spc="-1" strike="noStrike">
-              <a:solidFill>
-                <a:srgbClr val="ffffff"/>
-              </a:solidFill>
-              <a:uFill>
-                <a:solidFill>
-                  <a:srgbClr val="ffffff"/>
-                </a:solidFill>
-              </a:uFill>
-              <a:latin typeface="Arial"/>
-            </a:endParaRPr>
           </a:p>
         </p:txBody>
       </p:sp>
       <p:sp>
         <p:nvSpPr>
-          <p:cNvPr id="1" name="PlaceHolder 2"/>
+          <p:cNvPr id="6" name="PlaceHolder 2"/>
           <p:cNvSpPr>
             <a:spLocks noGrp="1"/>
           </p:cNvSpPr>
@@ -1727,274 +1885,198 @@
           </a:prstGeom>
         </p:spPr>
         <p:txBody>
-          <a:bodyPr lIns="0" rIns="0" tIns="0" bIns="0">
+          <a:bodyPr lIns="0" tIns="0" rIns="0" bIns="0">
             <a:normAutofit/>
           </a:bodyPr>
+          <a:lstStyle/>
           <a:p>
             <a:pPr marL="432000" indent="-324000">
               <a:spcBef>
                 <a:spcPts val="4003"/>
               </a:spcBef>
               <a:buClr>
-                <a:srgbClr val="ffffff"/>
+                <a:srgbClr val="FFFFFF"/>
               </a:buClr>
               <a:buSzPct val="45000"/>
               <a:buFont typeface="Wingdings" charset="2"/>
               <a:buChar char=""/>
             </a:pPr>
             <a:r>
-              <a:rPr b="0" lang="fr-CH" sz="9040" spc="-1" strike="noStrike">
-                <a:solidFill>
-                  <a:srgbClr val="ffffff"/>
-                </a:solidFill>
-                <a:uFill>
-                  <a:solidFill>
-                    <a:srgbClr val="ffffff"/>
+              <a:rPr lang="fr-CH" sz="9040" b="0" strike="noStrike" spc="-1">
+                <a:solidFill>
+                  <a:srgbClr val="FFFFFF"/>
+                </a:solidFill>
+                <a:uFill>
+                  <a:solidFill>
+                    <a:srgbClr val="FFFFFF"/>
                   </a:solidFill>
                 </a:uFill>
                 <a:latin typeface="Arial"/>
               </a:rPr>
               <a:t>Cliquez pour éditer le format du plan de texte</a:t>
             </a:r>
-            <a:endParaRPr b="0" lang="fr-CH" sz="9040" spc="-1" strike="noStrike">
-              <a:solidFill>
-                <a:srgbClr val="ffffff"/>
-              </a:solidFill>
-              <a:uFill>
-                <a:solidFill>
-                  <a:srgbClr val="ffffff"/>
-                </a:solidFill>
-              </a:uFill>
-              <a:latin typeface="Arial"/>
-            </a:endParaRPr>
-          </a:p>
-          <a:p>
-            <a:pPr lvl="1" marL="864000" indent="-324000">
+          </a:p>
+          <a:p>
+            <a:pPr marL="864000" lvl="1" indent="-324000">
               <a:spcBef>
                 <a:spcPts val="3197"/>
               </a:spcBef>
               <a:buClr>
-                <a:srgbClr val="ffffff"/>
+                <a:srgbClr val="FFFFFF"/>
               </a:buClr>
               <a:buSzPct val="75000"/>
               <a:buFont typeface="Symbol" charset="2"/>
               <a:buChar char=""/>
             </a:pPr>
             <a:r>
-              <a:rPr b="0" lang="fr-CH" sz="7910" spc="-1" strike="noStrike">
-                <a:solidFill>
-                  <a:srgbClr val="ffffff"/>
-                </a:solidFill>
-                <a:uFill>
-                  <a:solidFill>
-                    <a:srgbClr val="ffffff"/>
+              <a:rPr lang="fr-CH" sz="7910" b="0" strike="noStrike" spc="-1">
+                <a:solidFill>
+                  <a:srgbClr val="FFFFFF"/>
+                </a:solidFill>
+                <a:uFill>
+                  <a:solidFill>
+                    <a:srgbClr val="FFFFFF"/>
                   </a:solidFill>
                 </a:uFill>
                 <a:latin typeface="Arial"/>
               </a:rPr>
               <a:t>Second niveau de plan</a:t>
             </a:r>
-            <a:endParaRPr b="0" lang="fr-CH" sz="7910" spc="-1" strike="noStrike">
-              <a:solidFill>
-                <a:srgbClr val="ffffff"/>
-              </a:solidFill>
-              <a:uFill>
-                <a:solidFill>
-                  <a:srgbClr val="ffffff"/>
-                </a:solidFill>
-              </a:uFill>
-              <a:latin typeface="Arial"/>
-            </a:endParaRPr>
-          </a:p>
-          <a:p>
-            <a:pPr lvl="2" marL="1296000" indent="-288000">
+          </a:p>
+          <a:p>
+            <a:pPr marL="1296000" lvl="2" indent="-288000">
               <a:spcBef>
                 <a:spcPts val="2398"/>
               </a:spcBef>
               <a:buClr>
-                <a:srgbClr val="ffffff"/>
+                <a:srgbClr val="FFFFFF"/>
               </a:buClr>
               <a:buSzPct val="45000"/>
               <a:buFont typeface="Wingdings" charset="2"/>
               <a:buChar char=""/>
             </a:pPr>
             <a:r>
-              <a:rPr b="0" lang="fr-CH" sz="6780" spc="-1" strike="noStrike">
-                <a:solidFill>
-                  <a:srgbClr val="ffffff"/>
-                </a:solidFill>
-                <a:uFill>
-                  <a:solidFill>
-                    <a:srgbClr val="ffffff"/>
+              <a:rPr lang="fr-CH" sz="6780" b="0" strike="noStrike" spc="-1">
+                <a:solidFill>
+                  <a:srgbClr val="FFFFFF"/>
+                </a:solidFill>
+                <a:uFill>
+                  <a:solidFill>
+                    <a:srgbClr val="FFFFFF"/>
                   </a:solidFill>
                 </a:uFill>
                 <a:latin typeface="Arial"/>
               </a:rPr>
               <a:t>Troisième niveau de plan</a:t>
             </a:r>
-            <a:endParaRPr b="0" lang="fr-CH" sz="6780" spc="-1" strike="noStrike">
-              <a:solidFill>
-                <a:srgbClr val="ffffff"/>
-              </a:solidFill>
-              <a:uFill>
-                <a:solidFill>
-                  <a:srgbClr val="ffffff"/>
-                </a:solidFill>
-              </a:uFill>
-              <a:latin typeface="Arial"/>
-            </a:endParaRPr>
-          </a:p>
-          <a:p>
-            <a:pPr lvl="3" marL="1728000" indent="-216000">
+          </a:p>
+          <a:p>
+            <a:pPr marL="1728000" lvl="3" indent="-216000">
               <a:spcBef>
                 <a:spcPts val="1593"/>
               </a:spcBef>
               <a:buClr>
-                <a:srgbClr val="ffffff"/>
+                <a:srgbClr val="FFFFFF"/>
               </a:buClr>
               <a:buSzPct val="75000"/>
               <a:buFont typeface="Symbol" charset="2"/>
               <a:buChar char=""/>
             </a:pPr>
             <a:r>
-              <a:rPr b="0" lang="fr-CH" sz="5650" spc="-1" strike="noStrike">
-                <a:solidFill>
-                  <a:srgbClr val="ffffff"/>
-                </a:solidFill>
-                <a:uFill>
-                  <a:solidFill>
-                    <a:srgbClr val="ffffff"/>
+              <a:rPr lang="fr-CH" sz="5650" b="0" strike="noStrike" spc="-1">
+                <a:solidFill>
+                  <a:srgbClr val="FFFFFF"/>
+                </a:solidFill>
+                <a:uFill>
+                  <a:solidFill>
+                    <a:srgbClr val="FFFFFF"/>
                   </a:solidFill>
                 </a:uFill>
                 <a:latin typeface="Arial"/>
               </a:rPr>
               <a:t>Quatrième niveau de plan</a:t>
             </a:r>
-            <a:endParaRPr b="0" lang="fr-CH" sz="5650" spc="-1" strike="noStrike">
-              <a:solidFill>
-                <a:srgbClr val="ffffff"/>
-              </a:solidFill>
-              <a:uFill>
-                <a:solidFill>
-                  <a:srgbClr val="ffffff"/>
-                </a:solidFill>
-              </a:uFill>
-              <a:latin typeface="Arial"/>
-            </a:endParaRPr>
-          </a:p>
-          <a:p>
-            <a:pPr lvl="4" marL="2160000" indent="-216000">
+          </a:p>
+          <a:p>
+            <a:pPr marL="2160000" lvl="4" indent="-216000">
               <a:spcBef>
                 <a:spcPts val="797"/>
               </a:spcBef>
               <a:buClr>
-                <a:srgbClr val="ffffff"/>
+                <a:srgbClr val="FFFFFF"/>
               </a:buClr>
               <a:buSzPct val="45000"/>
               <a:buFont typeface="Wingdings" charset="2"/>
               <a:buChar char=""/>
             </a:pPr>
             <a:r>
-              <a:rPr b="0" lang="fr-CH" sz="5650" spc="-1" strike="noStrike">
-                <a:solidFill>
-                  <a:srgbClr val="ffffff"/>
-                </a:solidFill>
-                <a:uFill>
-                  <a:solidFill>
-                    <a:srgbClr val="ffffff"/>
+              <a:rPr lang="fr-CH" sz="5650" b="0" strike="noStrike" spc="-1">
+                <a:solidFill>
+                  <a:srgbClr val="FFFFFF"/>
+                </a:solidFill>
+                <a:uFill>
+                  <a:solidFill>
+                    <a:srgbClr val="FFFFFF"/>
                   </a:solidFill>
                 </a:uFill>
                 <a:latin typeface="Arial"/>
               </a:rPr>
               <a:t>Cinquième niveau de plan</a:t>
             </a:r>
-            <a:endParaRPr b="0" lang="fr-CH" sz="5650" spc="-1" strike="noStrike">
-              <a:solidFill>
-                <a:srgbClr val="ffffff"/>
-              </a:solidFill>
-              <a:uFill>
-                <a:solidFill>
-                  <a:srgbClr val="ffffff"/>
-                </a:solidFill>
-              </a:uFill>
-              <a:latin typeface="Arial"/>
-            </a:endParaRPr>
-          </a:p>
-          <a:p>
-            <a:pPr lvl="5" marL="2592000" indent="-216000">
+          </a:p>
+          <a:p>
+            <a:pPr marL="2592000" lvl="5" indent="-216000">
               <a:spcBef>
                 <a:spcPts val="797"/>
               </a:spcBef>
               <a:buClr>
-                <a:srgbClr val="ffffff"/>
+                <a:srgbClr val="FFFFFF"/>
               </a:buClr>
               <a:buSzPct val="45000"/>
               <a:buFont typeface="Wingdings" charset="2"/>
               <a:buChar char=""/>
             </a:pPr>
             <a:r>
-              <a:rPr b="0" lang="fr-CH" sz="5650" spc="-1" strike="noStrike">
-                <a:solidFill>
-                  <a:srgbClr val="ffffff"/>
-                </a:solidFill>
-                <a:uFill>
-                  <a:solidFill>
-                    <a:srgbClr val="ffffff"/>
+              <a:rPr lang="fr-CH" sz="5650" b="0" strike="noStrike" spc="-1">
+                <a:solidFill>
+                  <a:srgbClr val="FFFFFF"/>
+                </a:solidFill>
+                <a:uFill>
+                  <a:solidFill>
+                    <a:srgbClr val="FFFFFF"/>
                   </a:solidFill>
                 </a:uFill>
                 <a:latin typeface="Arial"/>
               </a:rPr>
               <a:t>Sixième niveau de plan</a:t>
             </a:r>
-            <a:endParaRPr b="0" lang="fr-CH" sz="5650" spc="-1" strike="noStrike">
-              <a:solidFill>
-                <a:srgbClr val="ffffff"/>
-              </a:solidFill>
-              <a:uFill>
-                <a:solidFill>
-                  <a:srgbClr val="ffffff"/>
-                </a:solidFill>
-              </a:uFill>
-              <a:latin typeface="Arial"/>
-            </a:endParaRPr>
-          </a:p>
-          <a:p>
-            <a:pPr lvl="6" marL="3024000" indent="-216000">
+          </a:p>
+          <a:p>
+            <a:pPr marL="3024000" lvl="6" indent="-216000">
               <a:spcBef>
                 <a:spcPts val="797"/>
               </a:spcBef>
               <a:buClr>
-                <a:srgbClr val="ffffff"/>
+                <a:srgbClr val="FFFFFF"/>
               </a:buClr>
               <a:buSzPct val="45000"/>
               <a:buFont typeface="Wingdings" charset="2"/>
               <a:buChar char=""/>
             </a:pPr>
             <a:r>
-              <a:rPr b="0" lang="fr-CH" sz="5650" spc="-1" strike="noStrike">
-                <a:solidFill>
-                  <a:srgbClr val="ffffff"/>
-                </a:solidFill>
-                <a:uFill>
-                  <a:solidFill>
-                    <a:srgbClr val="ffffff"/>
+              <a:rPr lang="fr-CH" sz="5650" b="0" strike="noStrike" spc="-1">
+                <a:solidFill>
+                  <a:srgbClr val="FFFFFF"/>
+                </a:solidFill>
+                <a:uFill>
+                  <a:solidFill>
+                    <a:srgbClr val="FFFFFF"/>
                   </a:solidFill>
                 </a:uFill>
                 <a:latin typeface="Arial"/>
               </a:rPr>
               <a:t>Septième niveau de plan</a:t>
             </a:r>
-            <a:endParaRPr b="0" lang="fr-CH" sz="5650" spc="-1" strike="noStrike">
-              <a:solidFill>
-                <a:srgbClr val="ffffff"/>
-              </a:solidFill>
-              <a:uFill>
-                <a:solidFill>
-                  <a:srgbClr val="ffffff"/>
-                </a:solidFill>
-              </a:uFill>
-              <a:latin typeface="Arial"/>
-            </a:endParaRPr>
           </a:p>
         </p:txBody>
       </p:sp>
@@ -2018,33 +2100,23 @@
           </a:prstGeom>
         </p:spPr>
         <p:txBody>
-          <a:bodyPr lIns="0" rIns="0" tIns="0" bIns="0"/>
-          <a:p>
-            <a:r>
-              <a:rPr b="0" lang="fr-CH" sz="1400" spc="-1" strike="noStrike">
-                <a:solidFill>
-                  <a:srgbClr val="ffffff"/>
-                </a:solidFill>
-                <a:uFill>
-                  <a:solidFill>
-                    <a:srgbClr val="ffffff"/>
+          <a:bodyPr lIns="0" tIns="0" rIns="0" bIns="0"/>
+          <a:lstStyle/>
+          <a:p>
+            <a:r>
+              <a:rPr lang="fr-CH" sz="1400" b="0" strike="noStrike" spc="-1">
+                <a:solidFill>
+                  <a:srgbClr val="FFFFFF"/>
+                </a:solidFill>
+                <a:uFill>
+                  <a:solidFill>
+                    <a:srgbClr val="FFFFFF"/>
                   </a:solidFill>
                 </a:uFill>
                 <a:latin typeface="Times New Roman"/>
               </a:rPr>
               <a:t>&lt;date/heure&gt;</a:t>
             </a:r>
-            <a:endParaRPr b="0" lang="fr-CH" sz="1400" spc="-1" strike="noStrike">
-              <a:solidFill>
-                <a:srgbClr val="ffffff"/>
-              </a:solidFill>
-              <a:uFill>
-                <a:solidFill>
-                  <a:srgbClr val="ffffff"/>
-                </a:solidFill>
-              </a:uFill>
-              <a:latin typeface="Times New Roman"/>
-            </a:endParaRPr>
           </a:p>
         </p:txBody>
       </p:sp>
@@ -2068,34 +2140,24 @@
           </a:prstGeom>
         </p:spPr>
         <p:txBody>
-          <a:bodyPr lIns="0" rIns="0" tIns="0" bIns="0"/>
+          <a:bodyPr lIns="0" tIns="0" rIns="0" bIns="0"/>
+          <a:lstStyle/>
           <a:p>
             <a:pPr algn="ctr"/>
             <a:r>
-              <a:rPr b="0" lang="fr-CH" sz="1400" spc="-1" strike="noStrike">
-                <a:solidFill>
-                  <a:srgbClr val="ffffff"/>
-                </a:solidFill>
-                <a:uFill>
-                  <a:solidFill>
-                    <a:srgbClr val="ffffff"/>
+              <a:rPr lang="fr-CH" sz="1400" b="0" strike="noStrike" spc="-1">
+                <a:solidFill>
+                  <a:srgbClr val="FFFFFF"/>
+                </a:solidFill>
+                <a:uFill>
+                  <a:solidFill>
+                    <a:srgbClr val="FFFFFF"/>
                   </a:solidFill>
                 </a:uFill>
                 <a:latin typeface="Times New Roman"/>
               </a:rPr>
               <a:t>&lt;pied de page&gt;</a:t>
             </a:r>
-            <a:endParaRPr b="0" lang="fr-CH" sz="1400" spc="-1" strike="noStrike">
-              <a:solidFill>
-                <a:srgbClr val="ffffff"/>
-              </a:solidFill>
-              <a:uFill>
-                <a:solidFill>
-                  <a:srgbClr val="ffffff"/>
-                </a:solidFill>
-              </a:uFill>
-              <a:latin typeface="Times New Roman"/>
-            </a:endParaRPr>
           </a:p>
         </p:txBody>
       </p:sp>
@@ -2119,30 +2181,31 @@
           </a:prstGeom>
         </p:spPr>
         <p:txBody>
-          <a:bodyPr lIns="0" rIns="0" tIns="0" bIns="0"/>
+          <a:bodyPr lIns="0" tIns="0" rIns="0" bIns="0"/>
+          <a:lstStyle/>
           <a:p>
             <a:pPr algn="r"/>
             <a:fld id="{AACBCBB8-F615-4AEF-9B1E-0516A9445A59}" type="slidenum">
-              <a:rPr b="0" lang="fr-CH" sz="1400" spc="-1" strike="noStrike">
-                <a:solidFill>
-                  <a:srgbClr val="ffffff"/>
-                </a:solidFill>
-                <a:uFill>
-                  <a:solidFill>
-                    <a:srgbClr val="ffffff"/>
+              <a:rPr lang="fr-CH" sz="1400" b="0" strike="noStrike" spc="-1">
+                <a:solidFill>
+                  <a:srgbClr val="FFFFFF"/>
+                </a:solidFill>
+                <a:uFill>
+                  <a:solidFill>
+                    <a:srgbClr val="FFFFFF"/>
                   </a:solidFill>
                 </a:uFill>
                 <a:latin typeface="Times New Roman"/>
               </a:rPr>
-              <a:t>&lt;numéro&gt;</a:t>
+              <a:t>‹N°›</a:t>
             </a:fld>
-            <a:endParaRPr b="0" lang="fr-CH" sz="1400" spc="-1" strike="noStrike">
+            <a:endParaRPr lang="fr-CH" sz="1400" b="0" strike="noStrike" spc="-1">
               <a:solidFill>
-                <a:srgbClr val="ffffff"/>
+                <a:srgbClr val="FFFFFF"/>
               </a:solidFill>
               <a:uFill>
                 <a:solidFill>
-                  <a:srgbClr val="ffffff"/>
+                  <a:srgbClr val="FFFFFF"/>
                 </a:solidFill>
               </a:uFill>
               <a:latin typeface="Times New Roman"/>
@@ -2152,26 +2215,306 @@
       </p:sp>
     </p:spTree>
   </p:cSld>
-  <p:clrMap bg1="lt1" bg2="lt2" tx1="dk1" tx2="dk2" accent1="accent1" accent2="accent2" accent3="accent3" accent4="accent4" accent5="accent5" accent6="accent6" hlink="hlink" folHlink="folHlink"/>
+  <p:clrMap bg1="lt1" tx1="dk1" bg2="lt2" tx2="dk2" accent1="accent1" accent2="accent2" accent3="accent3" accent4="accent4" accent5="accent5" accent6="accent6" hlink="hlink" folHlink="folHlink"/>
   <p:sldLayoutIdLst>
-    <p:sldLayoutId id="2147483649" r:id="rId2"/>
-    <p:sldLayoutId id="2147483650" r:id="rId3"/>
-    <p:sldLayoutId id="2147483651" r:id="rId4"/>
-    <p:sldLayoutId id="2147483652" r:id="rId5"/>
-    <p:sldLayoutId id="2147483653" r:id="rId6"/>
-    <p:sldLayoutId id="2147483654" r:id="rId7"/>
-    <p:sldLayoutId id="2147483655" r:id="rId8"/>
-    <p:sldLayoutId id="2147483656" r:id="rId9"/>
-    <p:sldLayoutId id="2147483657" r:id="rId10"/>
-    <p:sldLayoutId id="2147483658" r:id="rId11"/>
-    <p:sldLayoutId id="2147483659" r:id="rId12"/>
-    <p:sldLayoutId id="2147483660" r:id="rId13"/>
+    <p:sldLayoutId id="2147483649" r:id="rId1"/>
+    <p:sldLayoutId id="2147483650" r:id="rId2"/>
+    <p:sldLayoutId id="2147483651" r:id="rId3"/>
+    <p:sldLayoutId id="2147483652" r:id="rId4"/>
+    <p:sldLayoutId id="2147483653" r:id="rId5"/>
+    <p:sldLayoutId id="2147483654" r:id="rId6"/>
+    <p:sldLayoutId id="2147483655" r:id="rId7"/>
+    <p:sldLayoutId id="2147483656" r:id="rId8"/>
+    <p:sldLayoutId id="2147483657" r:id="rId9"/>
+    <p:sldLayoutId id="2147483658" r:id="rId10"/>
+    <p:sldLayoutId id="2147483659" r:id="rId11"/>
+    <p:sldLayoutId id="2147483660" r:id="rId12"/>
   </p:sldLayoutIdLst>
+  <p:txStyles>
+    <p:titleStyle>
+      <a:lvl1pPr algn="l" defTabSz="914400" rtl="0" eaLnBrk="1" latinLnBrk="0" hangingPunct="1">
+        <a:lnSpc>
+          <a:spcPct val="90000"/>
+        </a:lnSpc>
+        <a:spcBef>
+          <a:spcPct val="0"/>
+        </a:spcBef>
+        <a:buNone/>
+        <a:defRPr sz="4400" kern="1200">
+          <a:solidFill>
+            <a:schemeClr val="tx1"/>
+          </a:solidFill>
+          <a:latin typeface="+mj-lt"/>
+          <a:ea typeface="+mj-ea"/>
+          <a:cs typeface="+mj-cs"/>
+        </a:defRPr>
+      </a:lvl1pPr>
+    </p:titleStyle>
+    <p:bodyStyle>
+      <a:lvl1pPr marL="228600" indent="-228600" algn="l" defTabSz="914400" rtl="0" eaLnBrk="1" latinLnBrk="0" hangingPunct="1">
+        <a:lnSpc>
+          <a:spcPct val="90000"/>
+        </a:lnSpc>
+        <a:spcBef>
+          <a:spcPts val="1000"/>
+        </a:spcBef>
+        <a:buFont typeface="Arial" panose="020B0604020202020204" pitchFamily="34" charset="0"/>
+        <a:buChar char="•"/>
+        <a:defRPr sz="2800" kern="1200">
+          <a:solidFill>
+            <a:schemeClr val="tx1"/>
+          </a:solidFill>
+          <a:latin typeface="+mn-lt"/>
+          <a:ea typeface="+mn-ea"/>
+          <a:cs typeface="+mn-cs"/>
+        </a:defRPr>
+      </a:lvl1pPr>
+      <a:lvl2pPr marL="685800" indent="-228600" algn="l" defTabSz="914400" rtl="0" eaLnBrk="1" latinLnBrk="0" hangingPunct="1">
+        <a:lnSpc>
+          <a:spcPct val="90000"/>
+        </a:lnSpc>
+        <a:spcBef>
+          <a:spcPts val="500"/>
+        </a:spcBef>
+        <a:buFont typeface="Arial" panose="020B0604020202020204" pitchFamily="34" charset="0"/>
+        <a:buChar char="•"/>
+        <a:defRPr sz="2400" kern="1200">
+          <a:solidFill>
+            <a:schemeClr val="tx1"/>
+          </a:solidFill>
+          <a:latin typeface="+mn-lt"/>
+          <a:ea typeface="+mn-ea"/>
+          <a:cs typeface="+mn-cs"/>
+        </a:defRPr>
+      </a:lvl2pPr>
+      <a:lvl3pPr marL="1143000" indent="-228600" algn="l" defTabSz="914400" rtl="0" eaLnBrk="1" latinLnBrk="0" hangingPunct="1">
+        <a:lnSpc>
+          <a:spcPct val="90000"/>
+        </a:lnSpc>
+        <a:spcBef>
+          <a:spcPts val="500"/>
+        </a:spcBef>
+        <a:buFont typeface="Arial" panose="020B0604020202020204" pitchFamily="34" charset="0"/>
+        <a:buChar char="•"/>
+        <a:defRPr sz="2000" kern="1200">
+          <a:solidFill>
+            <a:schemeClr val="tx1"/>
+          </a:solidFill>
+          <a:latin typeface="+mn-lt"/>
+          <a:ea typeface="+mn-ea"/>
+          <a:cs typeface="+mn-cs"/>
+        </a:defRPr>
+      </a:lvl3pPr>
+      <a:lvl4pPr marL="1600200" indent="-228600" algn="l" defTabSz="914400" rtl="0" eaLnBrk="1" latinLnBrk="0" hangingPunct="1">
+        <a:lnSpc>
+          <a:spcPct val="90000"/>
+        </a:lnSpc>
+        <a:spcBef>
+          <a:spcPts val="500"/>
+        </a:spcBef>
+        <a:buFont typeface="Arial" panose="020B0604020202020204" pitchFamily="34" charset="0"/>
+        <a:buChar char="•"/>
+        <a:defRPr sz="1800" kern="1200">
+          <a:solidFill>
+            <a:schemeClr val="tx1"/>
+          </a:solidFill>
+          <a:latin typeface="+mn-lt"/>
+          <a:ea typeface="+mn-ea"/>
+          <a:cs typeface="+mn-cs"/>
+        </a:defRPr>
+      </a:lvl4pPr>
+      <a:lvl5pPr marL="2057400" indent="-228600" algn="l" defTabSz="914400" rtl="0" eaLnBrk="1" latinLnBrk="0" hangingPunct="1">
+        <a:lnSpc>
+          <a:spcPct val="90000"/>
+        </a:lnSpc>
+        <a:spcBef>
+          <a:spcPts val="500"/>
+        </a:spcBef>
+        <a:buFont typeface="Arial" panose="020B0604020202020204" pitchFamily="34" charset="0"/>
+        <a:buChar char="•"/>
+        <a:defRPr sz="1800" kern="1200">
+          <a:solidFill>
+            <a:schemeClr val="tx1"/>
+          </a:solidFill>
+          <a:latin typeface="+mn-lt"/>
+          <a:ea typeface="+mn-ea"/>
+          <a:cs typeface="+mn-cs"/>
+        </a:defRPr>
+      </a:lvl5pPr>
+      <a:lvl6pPr marL="2514600" indent="-228600" algn="l" defTabSz="914400" rtl="0" eaLnBrk="1" latinLnBrk="0" hangingPunct="1">
+        <a:lnSpc>
+          <a:spcPct val="90000"/>
+        </a:lnSpc>
+        <a:spcBef>
+          <a:spcPts val="500"/>
+        </a:spcBef>
+        <a:buFont typeface="Arial" panose="020B0604020202020204" pitchFamily="34" charset="0"/>
+        <a:buChar char="•"/>
+        <a:defRPr sz="1800" kern="1200">
+          <a:solidFill>
+            <a:schemeClr val="tx1"/>
+          </a:solidFill>
+          <a:latin typeface="+mn-lt"/>
+          <a:ea typeface="+mn-ea"/>
+          <a:cs typeface="+mn-cs"/>
+        </a:defRPr>
+      </a:lvl6pPr>
+      <a:lvl7pPr marL="2971800" indent="-228600" algn="l" defTabSz="914400" rtl="0" eaLnBrk="1" latinLnBrk="0" hangingPunct="1">
+        <a:lnSpc>
+          <a:spcPct val="90000"/>
+        </a:lnSpc>
+        <a:spcBef>
+          <a:spcPts val="500"/>
+        </a:spcBef>
+        <a:buFont typeface="Arial" panose="020B0604020202020204" pitchFamily="34" charset="0"/>
+        <a:buChar char="•"/>
+        <a:defRPr sz="1800" kern="1200">
+          <a:solidFill>
+            <a:schemeClr val="tx1"/>
+          </a:solidFill>
+          <a:latin typeface="+mn-lt"/>
+          <a:ea typeface="+mn-ea"/>
+          <a:cs typeface="+mn-cs"/>
+        </a:defRPr>
+      </a:lvl7pPr>
+      <a:lvl8pPr marL="3429000" indent="-228600" algn="l" defTabSz="914400" rtl="0" eaLnBrk="1" latinLnBrk="0" hangingPunct="1">
+        <a:lnSpc>
+          <a:spcPct val="90000"/>
+        </a:lnSpc>
+        <a:spcBef>
+          <a:spcPts val="500"/>
+        </a:spcBef>
+        <a:buFont typeface="Arial" panose="020B0604020202020204" pitchFamily="34" charset="0"/>
+        <a:buChar char="•"/>
+        <a:defRPr sz="1800" kern="1200">
+          <a:solidFill>
+            <a:schemeClr val="tx1"/>
+          </a:solidFill>
+          <a:latin typeface="+mn-lt"/>
+          <a:ea typeface="+mn-ea"/>
+          <a:cs typeface="+mn-cs"/>
+        </a:defRPr>
+      </a:lvl8pPr>
+      <a:lvl9pPr marL="3886200" indent="-228600" algn="l" defTabSz="914400" rtl="0" eaLnBrk="1" latinLnBrk="0" hangingPunct="1">
+        <a:lnSpc>
+          <a:spcPct val="90000"/>
+        </a:lnSpc>
+        <a:spcBef>
+          <a:spcPts val="500"/>
+        </a:spcBef>
+        <a:buFont typeface="Arial" panose="020B0604020202020204" pitchFamily="34" charset="0"/>
+        <a:buChar char="•"/>
+        <a:defRPr sz="1800" kern="1200">
+          <a:solidFill>
+            <a:schemeClr val="tx1"/>
+          </a:solidFill>
+          <a:latin typeface="+mn-lt"/>
+          <a:ea typeface="+mn-ea"/>
+          <a:cs typeface="+mn-cs"/>
+        </a:defRPr>
+      </a:lvl9pPr>
+    </p:bodyStyle>
+    <p:otherStyle>
+      <a:defPPr>
+        <a:defRPr lang="fr-FR"/>
+      </a:defPPr>
+      <a:lvl1pPr marL="0" algn="l" defTabSz="914400" rtl="0" eaLnBrk="1" latinLnBrk="0" hangingPunct="1">
+        <a:defRPr sz="1800" kern="1200">
+          <a:solidFill>
+            <a:schemeClr val="tx1"/>
+          </a:solidFill>
+          <a:latin typeface="+mn-lt"/>
+          <a:ea typeface="+mn-ea"/>
+          <a:cs typeface="+mn-cs"/>
+        </a:defRPr>
+      </a:lvl1pPr>
+      <a:lvl2pPr marL="457200" algn="l" defTabSz="914400" rtl="0" eaLnBrk="1" latinLnBrk="0" hangingPunct="1">
+        <a:defRPr sz="1800" kern="1200">
+          <a:solidFill>
+            <a:schemeClr val="tx1"/>
+          </a:solidFill>
+          <a:latin typeface="+mn-lt"/>
+          <a:ea typeface="+mn-ea"/>
+          <a:cs typeface="+mn-cs"/>
+        </a:defRPr>
+      </a:lvl2pPr>
+      <a:lvl3pPr marL="914400" algn="l" defTabSz="914400" rtl="0" eaLnBrk="1" latinLnBrk="0" hangingPunct="1">
+        <a:defRPr sz="1800" kern="1200">
+          <a:solidFill>
+            <a:schemeClr val="tx1"/>
+          </a:solidFill>
+          <a:latin typeface="+mn-lt"/>
+          <a:ea typeface="+mn-ea"/>
+          <a:cs typeface="+mn-cs"/>
+        </a:defRPr>
+      </a:lvl3pPr>
+      <a:lvl4pPr marL="1371600" algn="l" defTabSz="914400" rtl="0" eaLnBrk="1" latinLnBrk="0" hangingPunct="1">
+        <a:defRPr sz="1800" kern="1200">
+          <a:solidFill>
+            <a:schemeClr val="tx1"/>
+          </a:solidFill>
+          <a:latin typeface="+mn-lt"/>
+          <a:ea typeface="+mn-ea"/>
+          <a:cs typeface="+mn-cs"/>
+        </a:defRPr>
+      </a:lvl4pPr>
+      <a:lvl5pPr marL="1828800" algn="l" defTabSz="914400" rtl="0" eaLnBrk="1" latinLnBrk="0" hangingPunct="1">
+        <a:defRPr sz="1800" kern="1200">
+          <a:solidFill>
+            <a:schemeClr val="tx1"/>
+          </a:solidFill>
+          <a:latin typeface="+mn-lt"/>
+          <a:ea typeface="+mn-ea"/>
+          <a:cs typeface="+mn-cs"/>
+        </a:defRPr>
+      </a:lvl5pPr>
+      <a:lvl6pPr marL="2286000" algn="l" defTabSz="914400" rtl="0" eaLnBrk="1" latinLnBrk="0" hangingPunct="1">
+        <a:defRPr sz="1800" kern="1200">
+          <a:solidFill>
+            <a:schemeClr val="tx1"/>
+          </a:solidFill>
+          <a:latin typeface="+mn-lt"/>
+          <a:ea typeface="+mn-ea"/>
+          <a:cs typeface="+mn-cs"/>
+        </a:defRPr>
+      </a:lvl6pPr>
+      <a:lvl7pPr marL="2743200" algn="l" defTabSz="914400" rtl="0" eaLnBrk="1" latinLnBrk="0" hangingPunct="1">
+        <a:defRPr sz="1800" kern="1200">
+          <a:solidFill>
+            <a:schemeClr val="tx1"/>
+          </a:solidFill>
+          <a:latin typeface="+mn-lt"/>
+          <a:ea typeface="+mn-ea"/>
+          <a:cs typeface="+mn-cs"/>
+        </a:defRPr>
+      </a:lvl7pPr>
+      <a:lvl8pPr marL="3200400" algn="l" defTabSz="914400" rtl="0" eaLnBrk="1" latinLnBrk="0" hangingPunct="1">
+        <a:defRPr sz="1800" kern="1200">
+          <a:solidFill>
+            <a:schemeClr val="tx1"/>
+          </a:solidFill>
+          <a:latin typeface="+mn-lt"/>
+          <a:ea typeface="+mn-ea"/>
+          <a:cs typeface="+mn-cs"/>
+        </a:defRPr>
+      </a:lvl8pPr>
+      <a:lvl9pPr marL="3657600" algn="l" defTabSz="914400" rtl="0" eaLnBrk="1" latinLnBrk="0" hangingPunct="1">
+        <a:defRPr sz="1800" kern="1200">
+          <a:solidFill>
+            <a:schemeClr val="tx1"/>
+          </a:solidFill>
+          <a:latin typeface="+mn-lt"/>
+          <a:ea typeface="+mn-ea"/>
+          <a:cs typeface="+mn-cs"/>
+        </a:defRPr>
+      </a:lvl9pPr>
+    </p:otherStyle>
+  </p:txStyles>
 </p:sldMaster>
 </file>
 
 <file path=ppt/slides/slide1.xml><?xml version="1.0" encoding="utf-8"?>
-<p:sld xmlns:a="http://schemas.openxmlformats.org/drawingml/2006/main" xmlns:p="http://schemas.openxmlformats.org/presentationml/2006/main" xmlns:r="http://schemas.openxmlformats.org/officeDocument/2006/relationships" xmlns:p14="http://schemas.microsoft.com/office/powerpoint/2010/main" xmlns:p15="http://schemas.microsoft.com/office/powerpoint/2012/main" xmlns:mc="http://schemas.openxmlformats.org/markup-compatibility/2006">
+<p:sld xmlns:a="http://schemas.openxmlformats.org/drawingml/2006/main" xmlns:r="http://schemas.openxmlformats.org/officeDocument/2006/relationships" xmlns:p="http://schemas.openxmlformats.org/presentationml/2006/main">
   <p:cSld>
     <p:spTree>
       <p:nvGrpSpPr>
@@ -2187,28 +2530,6 @@
           <a:chExt cx="0" cy="0"/>
         </a:xfrm>
       </p:grpSpPr>
-      <p:pic>
-        <p:nvPicPr>
-          <p:cNvPr id="41" name="" descr=""/>
-          <p:cNvPicPr/>
-          <p:nvPr/>
-        </p:nvPicPr>
-        <p:blipFill>
-          <a:blip r:embed="rId1"/>
-        </p:blipFill>
-        <p:spPr>
-          <a:xfrm>
-            <a:off x="18000" y="10953000"/>
-            <a:ext cx="15066000" cy="10431000"/>
-          </a:xfrm>
-          <a:prstGeom prst="rect">
-            <a:avLst/>
-          </a:prstGeom>
-          <a:ln>
-            <a:noFill/>
-          </a:ln>
-        </p:spPr>
-      </p:pic>
       <p:sp>
         <p:nvSpPr>
           <p:cNvPr id="42" name="TextShape 1"/>
@@ -2229,16 +2550,17 @@
           </a:ln>
         </p:spPr>
         <p:txBody>
-          <a:bodyPr lIns="90000" rIns="90000" tIns="45000" bIns="45000"/>
+          <a:bodyPr lIns="90000" tIns="45000" rIns="90000" bIns="45000"/>
+          <a:lstStyle/>
           <a:p>
             <a:pPr algn="ctr"/>
-            <a:endParaRPr b="0" lang="fr-CH" sz="1800" spc="-1" strike="noStrike">
+            <a:endParaRPr lang="fr-CH" sz="1800" b="0" strike="noStrike" spc="-1">
               <a:solidFill>
-                <a:srgbClr val="f4dce1"/>
+                <a:srgbClr val="F4DCE1"/>
               </a:solidFill>
               <a:uFill>
                 <a:solidFill>
-                  <a:srgbClr val="ffffff"/>
+                  <a:srgbClr val="FFFFFF"/>
                 </a:solidFill>
               </a:uFill>
               <a:latin typeface="Arial"/>
@@ -2246,13 +2568,13 @@
           </a:p>
           <a:p>
             <a:pPr algn="just"/>
-            <a:endParaRPr b="0" lang="fr-CH" sz="1800" spc="-1" strike="noStrike">
+            <a:endParaRPr lang="fr-CH" sz="1800" b="0" strike="noStrike" spc="-1">
               <a:solidFill>
-                <a:srgbClr val="f4dce1"/>
+                <a:srgbClr val="F4DCE1"/>
               </a:solidFill>
               <a:uFill>
                 <a:solidFill>
-                  <a:srgbClr val="ffffff"/>
+                  <a:srgbClr val="FFFFFF"/>
                 </a:solidFill>
               </a:uFill>
               <a:latin typeface="Arial"/>
@@ -2260,13 +2582,13 @@
           </a:p>
           <a:p>
             <a:pPr algn="just"/>
-            <a:endParaRPr b="0" lang="fr-CH" sz="1800" spc="-1" strike="noStrike">
+            <a:endParaRPr lang="fr-CH" sz="1800" b="0" strike="noStrike" spc="-1">
               <a:solidFill>
-                <a:srgbClr val="f4dce1"/>
+                <a:srgbClr val="F4DCE1"/>
               </a:solidFill>
               <a:uFill>
                 <a:solidFill>
-                  <a:srgbClr val="ffffff"/>
+                  <a:srgbClr val="FFFFFF"/>
                 </a:solidFill>
               </a:uFill>
               <a:latin typeface="Arial"/>
@@ -2274,13 +2596,13 @@
           </a:p>
           <a:p>
             <a:pPr algn="just"/>
-            <a:endParaRPr b="0" lang="fr-CH" sz="1800" spc="-1" strike="noStrike">
+            <a:endParaRPr lang="fr-CH" sz="1800" b="0" strike="noStrike" spc="-1">
               <a:solidFill>
-                <a:srgbClr val="f4dce1"/>
+                <a:srgbClr val="F4DCE1"/>
               </a:solidFill>
               <a:uFill>
                 <a:solidFill>
-                  <a:srgbClr val="ffffff"/>
+                  <a:srgbClr val="FFFFFF"/>
                 </a:solidFill>
               </a:uFill>
               <a:latin typeface="Arial"/>
@@ -2308,62 +2630,41 @@
           </a:ln>
         </p:spPr>
         <p:txBody>
-          <a:bodyPr lIns="90000" rIns="90000" tIns="45000" bIns="45000"/>
+          <a:bodyPr lIns="90000" tIns="45000" rIns="90000" bIns="45000"/>
+          <a:lstStyle/>
           <a:p>
             <a:pPr algn="ctr"/>
             <a:r>
-              <a:rPr b="0" lang="fr-CH" sz="6000" spc="-1" strike="noStrike">
-                <a:solidFill>
-                  <a:srgbClr val="f4dce1"/>
-                </a:solidFill>
-                <a:uFill>
-                  <a:solidFill>
-                    <a:srgbClr val="ffffff"/>
+              <a:rPr lang="fr-CH" sz="6000" b="0" strike="noStrike" spc="-1">
+                <a:solidFill>
+                  <a:srgbClr val="F4DCE1"/>
+                </a:solidFill>
+                <a:uFill>
+                  <a:solidFill>
+                    <a:srgbClr val="FFFFFF"/>
                   </a:solidFill>
                 </a:uFill>
                 <a:latin typeface="Arial"/>
               </a:rPr>
               <a:t>An ecological study of the food industry</a:t>
             </a:r>
-            <a:endParaRPr b="0" lang="fr-CH" sz="6000" spc="-1" strike="noStrike">
-              <a:solidFill>
-                <a:srgbClr val="f4dce1"/>
-              </a:solidFill>
-              <a:uFill>
-                <a:solidFill>
-                  <a:srgbClr val="ffffff"/>
-                </a:solidFill>
-              </a:uFill>
-              <a:latin typeface="Arial"/>
-            </a:endParaRPr>
           </a:p>
           <a:p>
             <a:pPr algn="ctr"/>
             <a:r>
-              <a:rPr b="0" lang="fr-CH" sz="3800" spc="-1" strike="noStrike">
-                <a:solidFill>
-                  <a:srgbClr val="f4dce1"/>
-                </a:solidFill>
-                <a:uFill>
-                  <a:solidFill>
-                    <a:srgbClr val="ffffff"/>
+              <a:rPr lang="fr-CH" sz="3800" b="0" strike="noStrike" spc="-1">
+                <a:solidFill>
+                  <a:srgbClr val="F4DCE1"/>
+                </a:solidFill>
+                <a:uFill>
+                  <a:solidFill>
+                    <a:srgbClr val="FFFFFF"/>
                   </a:solidFill>
                 </a:uFill>
                 <a:latin typeface="Arial"/>
               </a:rPr>
               <a:t>Nicolas Freundler, Johan Lanzrein, Jennifer Veillard</a:t>
             </a:r>
-            <a:endParaRPr b="0" lang="fr-CH" sz="3800" spc="-1" strike="noStrike">
-              <a:solidFill>
-                <a:srgbClr val="f4dce1"/>
-              </a:solidFill>
-              <a:uFill>
-                <a:solidFill>
-                  <a:srgbClr val="ffffff"/>
-                </a:solidFill>
-              </a:uFill>
-              <a:latin typeface="Arial"/>
-            </a:endParaRPr>
           </a:p>
         </p:txBody>
       </p:sp>
@@ -2387,30 +2688,31 @@
           </a:ln>
         </p:spPr>
         <p:txBody>
-          <a:bodyPr lIns="90000" rIns="90000" tIns="45000" bIns="45000"/>
+          <a:bodyPr lIns="90000" tIns="45000" rIns="90000" bIns="45000"/>
+          <a:lstStyle/>
           <a:p>
             <a:pPr algn="just"/>
             <a:r>
-              <a:rPr b="1" lang="fr-CH" sz="2600" spc="-1" strike="noStrike" u="sng">
-                <a:solidFill>
-                  <a:srgbClr val="f4dce1"/>
-                </a:solidFill>
-                <a:uFill>
-                  <a:solidFill>
-                    <a:srgbClr val="ffffff"/>
+              <a:rPr lang="fr-CH" sz="2600" b="1" u="sng" strike="noStrike" spc="-1">
+                <a:solidFill>
+                  <a:srgbClr val="F4DCE1"/>
+                </a:solidFill>
+                <a:uFill>
+                  <a:solidFill>
+                    <a:srgbClr val="FFFFFF"/>
                   </a:solidFill>
                 </a:uFill>
                 <a:latin typeface="Arial"/>
               </a:rPr>
               <a:t>Abstract</a:t>
             </a:r>
-            <a:endParaRPr b="0" lang="fr-CH" sz="2600" spc="-1" strike="noStrike">
+            <a:endParaRPr lang="fr-CH" sz="2600" b="0" strike="noStrike" spc="-1">
               <a:solidFill>
-                <a:srgbClr val="f4dce1"/>
+                <a:srgbClr val="F4DCE1"/>
               </a:solidFill>
               <a:uFill>
                 <a:solidFill>
-                  <a:srgbClr val="ffffff"/>
+                  <a:srgbClr val="FFFFFF"/>
                 </a:solidFill>
               </a:uFill>
               <a:latin typeface="Arial"/>
@@ -2418,13 +2720,13 @@
           </a:p>
           <a:p>
             <a:pPr algn="just"/>
-            <a:endParaRPr b="0" lang="fr-CH" sz="2600" spc="-1" strike="noStrike">
+            <a:endParaRPr lang="fr-CH" sz="2600" b="0" strike="noStrike" spc="-1">
               <a:solidFill>
-                <a:srgbClr val="f4dce1"/>
+                <a:srgbClr val="F4DCE1"/>
               </a:solidFill>
               <a:uFill>
                 <a:solidFill>
-                  <a:srgbClr val="ffffff"/>
+                  <a:srgbClr val="FFFFFF"/>
                 </a:solidFill>
               </a:uFill>
               <a:latin typeface="Arial"/>
@@ -2433,26 +2735,46 @@
           <a:p>
             <a:pPr algn="just"/>
             <a:r>
-              <a:rPr b="0" lang="fr-CH" sz="1800" spc="-1" strike="noStrike">
-                <a:solidFill>
-                  <a:srgbClr val="f4dce1"/>
-                </a:solidFill>
-                <a:uFill>
-                  <a:solidFill>
-                    <a:srgbClr val="ffffff"/>
+              <a:rPr lang="fr-CH" sz="1800" b="0" strike="noStrike" spc="-1">
+                <a:solidFill>
+                  <a:srgbClr val="F4DCE1"/>
+                </a:solidFill>
+                <a:uFill>
+                  <a:solidFill>
+                    <a:srgbClr val="FFFFFF"/>
                   </a:solidFill>
                 </a:uFill>
                 <a:latin typeface="Arial"/>
               </a:rPr>
               <a:t>As ecology grows as a more important concern, populations need not only to focus on driving less or consuming less, but also on how they consume food. It is a known fact that consuming products derived from palm oil, or meat in general is much more damaging for the environment than growing your own vegetables. During this project, we aim to expose how to be more regarding towards the environment in our daily food consumption.</a:t>
             </a:r>
-            <a:endParaRPr b="0" lang="fr-CH" sz="1800" spc="-1" strike="noStrike">
+          </a:p>
+          <a:p>
+            <a:pPr algn="just"/>
+            <a:r>
+              <a:rPr lang="fr-CH" sz="1800" b="0" strike="noStrike" spc="-1">
+                <a:solidFill>
+                  <a:srgbClr val="F4DCE1"/>
+                </a:solidFill>
+                <a:uFill>
+                  <a:solidFill>
+                    <a:srgbClr val="FFFFFF"/>
+                  </a:solidFill>
+                </a:uFill>
+                <a:latin typeface="Arial"/>
+              </a:rPr>
+              <a:t>The main goal is to investigate the world of food and understand what are some hints to take when we want to consume more eco-friendly.</a:t>
+            </a:r>
+          </a:p>
+          <a:p>
+            <a:pPr algn="just"/>
+            <a:endParaRPr lang="fr-CH" sz="1800" b="0" strike="noStrike" spc="-1">
               <a:solidFill>
-                <a:srgbClr val="f4dce1"/>
+                <a:srgbClr val="F4DCE1"/>
               </a:solidFill>
               <a:uFill>
                 <a:solidFill>
-                  <a:srgbClr val="ffffff"/>
+                  <a:srgbClr val="FFFFFF"/>
                 </a:solidFill>
               </a:uFill>
               <a:latin typeface="Arial"/>
@@ -2461,26 +2783,26 @@
           <a:p>
             <a:pPr algn="just"/>
             <a:r>
-              <a:rPr b="0" lang="fr-CH" sz="1800" spc="-1" strike="noStrike">
-                <a:solidFill>
-                  <a:srgbClr val="f4dce1"/>
-                </a:solidFill>
-                <a:uFill>
-                  <a:solidFill>
-                    <a:srgbClr val="ffffff"/>
-                  </a:solidFill>
-                </a:uFill>
-                <a:latin typeface="Arial"/>
-              </a:rPr>
-              <a:t>The main goal is to investigate the world of food and understand what are some hints to take when we want to consume more eco-friendly.</a:t>
-            </a:r>
-            <a:endParaRPr b="0" lang="fr-CH" sz="1800" spc="-1" strike="noStrike">
+              <a:rPr lang="fr-CH" sz="2500" b="1" u="sng" strike="noStrike" spc="-1">
+                <a:solidFill>
+                  <a:srgbClr val="F4DCE1"/>
+                </a:solidFill>
+                <a:uFill>
+                  <a:solidFill>
+                    <a:srgbClr val="FFFFFF"/>
+                  </a:solidFill>
+                </a:uFill>
+                <a:latin typeface="Arial"/>
+              </a:rPr>
+              <a:t>Methods</a:t>
+            </a:r>
+            <a:endParaRPr lang="fr-CH" sz="2500" b="0" strike="noStrike" spc="-1">
               <a:solidFill>
-                <a:srgbClr val="f4dce1"/>
+                <a:srgbClr val="F4DCE1"/>
               </a:solidFill>
               <a:uFill>
                 <a:solidFill>
-                  <a:srgbClr val="ffffff"/>
+                  <a:srgbClr val="FFFFFF"/>
                 </a:solidFill>
               </a:uFill>
               <a:latin typeface="Arial"/>
@@ -2488,101 +2810,37 @@
           </a:p>
           <a:p>
             <a:pPr algn="just"/>
-            <a:endParaRPr b="0" lang="fr-CH" sz="1800" spc="-1" strike="noStrike">
-              <a:solidFill>
-                <a:srgbClr val="f4dce1"/>
-              </a:solidFill>
-              <a:uFill>
-                <a:solidFill>
-                  <a:srgbClr val="ffffff"/>
-                </a:solidFill>
-              </a:uFill>
-              <a:latin typeface="Arial"/>
-            </a:endParaRPr>
+            <a:r>
+              <a:rPr lang="fr-CH" sz="1800" b="0" strike="noStrike" spc="-1">
+                <a:solidFill>
+                  <a:srgbClr val="F4DCE1"/>
+                </a:solidFill>
+                <a:uFill>
+                  <a:solidFill>
+                    <a:srgbClr val="FFFFFF"/>
+                  </a:solidFill>
+                </a:uFill>
+                <a:latin typeface="Arial"/>
+              </a:rPr>
+              <a:t>We explore the dataset using vairous tools, such as statistical analysis with PCA, or more basic statistics computation. We also use visualization to express our findings. </a:t>
+            </a:r>
           </a:p>
           <a:p>
             <a:pPr algn="just"/>
             <a:r>
-              <a:rPr b="1" lang="fr-CH" sz="2500" spc="-1" strike="noStrike" u="sng">
-                <a:solidFill>
-                  <a:srgbClr val="f4dce1"/>
-                </a:solidFill>
-                <a:uFill>
-                  <a:solidFill>
-                    <a:srgbClr val="ffffff"/>
-                  </a:solidFill>
-                </a:uFill>
-                <a:latin typeface="Arial"/>
-              </a:rPr>
-              <a:t>Methods</a:t>
-            </a:r>
-            <a:endParaRPr b="0" lang="fr-CH" sz="2500" spc="-1" strike="noStrike">
-              <a:solidFill>
-                <a:srgbClr val="f4dce1"/>
-              </a:solidFill>
-              <a:uFill>
-                <a:solidFill>
-                  <a:srgbClr val="ffffff"/>
-                </a:solidFill>
-              </a:uFill>
-              <a:latin typeface="Arial"/>
-            </a:endParaRPr>
-          </a:p>
-          <a:p>
-            <a:pPr algn="just"/>
-            <a:r>
-              <a:rPr b="0" lang="fr-CH" sz="1800" spc="-1" strike="noStrike">
-                <a:solidFill>
-                  <a:srgbClr val="f4dce1"/>
-                </a:solidFill>
-                <a:uFill>
-                  <a:solidFill>
-                    <a:srgbClr val="ffffff"/>
-                  </a:solidFill>
-                </a:uFill>
-                <a:latin typeface="Arial"/>
-              </a:rPr>
-              <a:t>We explore the dataset using vairous tools, such as statistical analysis with PCA, or more basic statistics computation. We also use visualization to express our findings. </a:t>
-            </a:r>
-            <a:endParaRPr b="0" lang="fr-CH" sz="1800" spc="-1" strike="noStrike">
-              <a:solidFill>
-                <a:srgbClr val="f4dce1"/>
-              </a:solidFill>
-              <a:uFill>
-                <a:solidFill>
-                  <a:srgbClr val="ffffff"/>
-                </a:solidFill>
-              </a:uFill>
-              <a:latin typeface="Arial"/>
-            </a:endParaRPr>
-          </a:p>
-          <a:p>
-            <a:pPr algn="just"/>
-            <a:r>
-              <a:rPr b="0" lang="fr-CH" sz="1800" spc="-1" strike="noStrike">
-                <a:solidFill>
-                  <a:srgbClr val="f4dce1"/>
-                </a:solidFill>
-                <a:uFill>
-                  <a:solidFill>
-                    <a:srgbClr val="ffffff"/>
+              <a:rPr lang="fr-CH" sz="1800" b="0" strike="noStrike" spc="-1">
+                <a:solidFill>
+                  <a:srgbClr val="F4DCE1"/>
+                </a:solidFill>
+                <a:uFill>
+                  <a:solidFill>
+                    <a:srgbClr val="FFFFFF"/>
                   </a:solidFill>
                 </a:uFill>
                 <a:latin typeface="Arial"/>
               </a:rPr>
               <a:t> </a:t>
             </a:r>
-            <a:endParaRPr b="0" lang="fr-CH" sz="1800" spc="-1" strike="noStrike">
-              <a:solidFill>
-                <a:srgbClr val="f4dce1"/>
-              </a:solidFill>
-              <a:uFill>
-                <a:solidFill>
-                  <a:srgbClr val="ffffff"/>
-                </a:solidFill>
-              </a:uFill>
-              <a:latin typeface="Arial"/>
-            </a:endParaRPr>
           </a:p>
         </p:txBody>
       </p:sp>
@@ -2606,30 +2864,31 @@
           </a:ln>
         </p:spPr>
         <p:txBody>
-          <a:bodyPr lIns="90000" rIns="90000" tIns="45000" bIns="45000"/>
+          <a:bodyPr lIns="90000" tIns="45000" rIns="90000" bIns="45000"/>
+          <a:lstStyle/>
           <a:p>
             <a:pPr algn="just"/>
             <a:r>
-              <a:rPr b="1" lang="fr-CH" sz="2500" spc="-1" strike="noStrike" u="sng">
-                <a:solidFill>
-                  <a:srgbClr val="f4dce1"/>
-                </a:solidFill>
-                <a:uFill>
-                  <a:solidFill>
-                    <a:srgbClr val="ffffff"/>
+              <a:rPr lang="fr-CH" sz="2500" b="1" u="sng" strike="noStrike" spc="-1" dirty="0">
+                <a:solidFill>
+                  <a:srgbClr val="F4DCE1"/>
+                </a:solidFill>
+                <a:uFill>
+                  <a:solidFill>
+                    <a:srgbClr val="FFFFFF"/>
                   </a:solidFill>
                 </a:uFill>
                 <a:latin typeface="Arial"/>
               </a:rPr>
               <a:t>Distance computation</a:t>
             </a:r>
-            <a:endParaRPr b="0" lang="fr-CH" sz="2500" spc="-1" strike="noStrike">
+            <a:endParaRPr lang="fr-CH" sz="2500" b="0" strike="noStrike" spc="-1" dirty="0">
               <a:solidFill>
-                <a:srgbClr val="f4dce1"/>
+                <a:srgbClr val="F4DCE1"/>
               </a:solidFill>
               <a:uFill>
                 <a:solidFill>
-                  <a:srgbClr val="ffffff"/>
+                  <a:srgbClr val="FFFFFF"/>
                 </a:solidFill>
               </a:uFill>
               <a:latin typeface="Arial"/>
@@ -2638,40 +2897,379 @@
           <a:p>
             <a:pPr algn="just"/>
             <a:r>
-              <a:rPr b="0" lang="fr-CH" sz="1800" spc="-1" strike="noStrike">
-                <a:solidFill>
-                  <a:srgbClr val="f4dce1"/>
-                </a:solidFill>
-                <a:uFill>
-                  <a:solidFill>
-                    <a:srgbClr val="ffffff"/>
-                  </a:solidFill>
-                </a:uFill>
-                <a:latin typeface="Arial"/>
-              </a:rPr>
-              <a:t>With the geopy library and some langage processing on the origin and destination of the products, we were able to compute how much the products travel. </a:t>
-            </a:r>
-            <a:endParaRPr b="0" lang="fr-CH" sz="1800" spc="-1" strike="noStrike">
+              <a:rPr lang="fr-CH" sz="1800" b="0" strike="noStrike" spc="-1" dirty="0" err="1">
+                <a:solidFill>
+                  <a:srgbClr val="F4DCE1"/>
+                </a:solidFill>
+                <a:uFill>
+                  <a:solidFill>
+                    <a:srgbClr val="FFFFFF"/>
+                  </a:solidFill>
+                </a:uFill>
+                <a:latin typeface="Arial"/>
+              </a:rPr>
+              <a:t>With</a:t>
+            </a:r>
+            <a:r>
+              <a:rPr lang="fr-CH" sz="1800" b="0" strike="noStrike" spc="-1" dirty="0">
+                <a:solidFill>
+                  <a:srgbClr val="F4DCE1"/>
+                </a:solidFill>
+                <a:uFill>
+                  <a:solidFill>
+                    <a:srgbClr val="FFFFFF"/>
+                  </a:solidFill>
+                </a:uFill>
+                <a:latin typeface="Arial"/>
+              </a:rPr>
+              <a:t> the </a:t>
+            </a:r>
+            <a:r>
+              <a:rPr lang="fr-CH" sz="1800" b="0" strike="noStrike" spc="-1" dirty="0" err="1">
+                <a:solidFill>
+                  <a:srgbClr val="F4DCE1"/>
+                </a:solidFill>
+                <a:uFill>
+                  <a:solidFill>
+                    <a:srgbClr val="FFFFFF"/>
+                  </a:solidFill>
+                </a:uFill>
+                <a:latin typeface="Arial"/>
+              </a:rPr>
+              <a:t>geopy</a:t>
+            </a:r>
+            <a:r>
+              <a:rPr lang="fr-CH" sz="1800" b="0" strike="noStrike" spc="-1" dirty="0">
+                <a:solidFill>
+                  <a:srgbClr val="F4DCE1"/>
+                </a:solidFill>
+                <a:uFill>
+                  <a:solidFill>
+                    <a:srgbClr val="FFFFFF"/>
+                  </a:solidFill>
+                </a:uFill>
+                <a:latin typeface="Arial"/>
+              </a:rPr>
+              <a:t> </a:t>
+            </a:r>
+            <a:r>
+              <a:rPr lang="fr-CH" sz="1800" b="0" strike="noStrike" spc="-1" dirty="0" err="1">
+                <a:solidFill>
+                  <a:srgbClr val="F4DCE1"/>
+                </a:solidFill>
+                <a:uFill>
+                  <a:solidFill>
+                    <a:srgbClr val="FFFFFF"/>
+                  </a:solidFill>
+                </a:uFill>
+                <a:latin typeface="Arial"/>
+              </a:rPr>
+              <a:t>library</a:t>
+            </a:r>
+            <a:r>
+              <a:rPr lang="fr-CH" sz="1800" b="0" strike="noStrike" spc="-1" dirty="0">
+                <a:solidFill>
+                  <a:srgbClr val="F4DCE1"/>
+                </a:solidFill>
+                <a:uFill>
+                  <a:solidFill>
+                    <a:srgbClr val="FFFFFF"/>
+                  </a:solidFill>
+                </a:uFill>
+                <a:latin typeface="Arial"/>
+              </a:rPr>
+              <a:t> and </a:t>
+            </a:r>
+            <a:r>
+              <a:rPr lang="fr-CH" sz="1800" b="0" strike="noStrike" spc="-1" dirty="0" err="1">
+                <a:solidFill>
+                  <a:srgbClr val="F4DCE1"/>
+                </a:solidFill>
+                <a:uFill>
+                  <a:solidFill>
+                    <a:srgbClr val="FFFFFF"/>
+                  </a:solidFill>
+                </a:uFill>
+                <a:latin typeface="Arial"/>
+              </a:rPr>
+              <a:t>some</a:t>
+            </a:r>
+            <a:r>
+              <a:rPr lang="fr-CH" sz="1800" b="0" strike="noStrike" spc="-1" dirty="0">
+                <a:solidFill>
+                  <a:srgbClr val="F4DCE1"/>
+                </a:solidFill>
+                <a:uFill>
+                  <a:solidFill>
+                    <a:srgbClr val="FFFFFF"/>
+                  </a:solidFill>
+                </a:uFill>
+                <a:latin typeface="Arial"/>
+              </a:rPr>
+              <a:t> langage </a:t>
+            </a:r>
+            <a:r>
+              <a:rPr lang="fr-CH" sz="1800" b="0" strike="noStrike" spc="-1" dirty="0" err="1">
+                <a:solidFill>
+                  <a:srgbClr val="F4DCE1"/>
+                </a:solidFill>
+                <a:uFill>
+                  <a:solidFill>
+                    <a:srgbClr val="FFFFFF"/>
+                  </a:solidFill>
+                </a:uFill>
+                <a:latin typeface="Arial"/>
+              </a:rPr>
+              <a:t>processing</a:t>
+            </a:r>
+            <a:r>
+              <a:rPr lang="fr-CH" sz="1800" b="0" strike="noStrike" spc="-1" dirty="0">
+                <a:solidFill>
+                  <a:srgbClr val="F4DCE1"/>
+                </a:solidFill>
+                <a:uFill>
+                  <a:solidFill>
+                    <a:srgbClr val="FFFFFF"/>
+                  </a:solidFill>
+                </a:uFill>
+                <a:latin typeface="Arial"/>
+              </a:rPr>
+              <a:t> on the </a:t>
+            </a:r>
+            <a:r>
+              <a:rPr lang="fr-CH" sz="1800" b="0" strike="noStrike" spc="-1" dirty="0" err="1">
+                <a:solidFill>
+                  <a:srgbClr val="F4DCE1"/>
+                </a:solidFill>
+                <a:uFill>
+                  <a:solidFill>
+                    <a:srgbClr val="FFFFFF"/>
+                  </a:solidFill>
+                </a:uFill>
+                <a:latin typeface="Arial"/>
+              </a:rPr>
+              <a:t>origin</a:t>
+            </a:r>
+            <a:r>
+              <a:rPr lang="fr-CH" sz="1800" b="0" strike="noStrike" spc="-1" dirty="0">
+                <a:solidFill>
+                  <a:srgbClr val="F4DCE1"/>
+                </a:solidFill>
+                <a:uFill>
+                  <a:solidFill>
+                    <a:srgbClr val="FFFFFF"/>
+                  </a:solidFill>
+                </a:uFill>
+                <a:latin typeface="Arial"/>
+              </a:rPr>
+              <a:t> and destination of the </a:t>
+            </a:r>
+            <a:r>
+              <a:rPr lang="fr-CH" sz="1800" b="0" strike="noStrike" spc="-1" dirty="0" err="1">
+                <a:solidFill>
+                  <a:srgbClr val="F4DCE1"/>
+                </a:solidFill>
+                <a:uFill>
+                  <a:solidFill>
+                    <a:srgbClr val="FFFFFF"/>
+                  </a:solidFill>
+                </a:uFill>
+                <a:latin typeface="Arial"/>
+              </a:rPr>
+              <a:t>products</a:t>
+            </a:r>
+            <a:r>
+              <a:rPr lang="fr-CH" sz="1800" b="0" strike="noStrike" spc="-1" dirty="0">
+                <a:solidFill>
+                  <a:srgbClr val="F4DCE1"/>
+                </a:solidFill>
+                <a:uFill>
+                  <a:solidFill>
+                    <a:srgbClr val="FFFFFF"/>
+                  </a:solidFill>
+                </a:uFill>
+                <a:latin typeface="Arial"/>
+              </a:rPr>
+              <a:t>, </a:t>
+            </a:r>
+            <a:r>
+              <a:rPr lang="fr-CH" sz="1800" b="0" strike="noStrike" spc="-1" dirty="0" err="1">
+                <a:solidFill>
+                  <a:srgbClr val="F4DCE1"/>
+                </a:solidFill>
+                <a:uFill>
+                  <a:solidFill>
+                    <a:srgbClr val="FFFFFF"/>
+                  </a:solidFill>
+                </a:uFill>
+                <a:latin typeface="Arial"/>
+              </a:rPr>
+              <a:t>we</a:t>
+            </a:r>
+            <a:r>
+              <a:rPr lang="fr-CH" sz="1800" b="0" strike="noStrike" spc="-1" dirty="0">
+                <a:solidFill>
+                  <a:srgbClr val="F4DCE1"/>
+                </a:solidFill>
+                <a:uFill>
+                  <a:solidFill>
+                    <a:srgbClr val="FFFFFF"/>
+                  </a:solidFill>
+                </a:uFill>
+                <a:latin typeface="Arial"/>
+              </a:rPr>
+              <a:t> </a:t>
+            </a:r>
+            <a:r>
+              <a:rPr lang="fr-CH" sz="1800" b="0" strike="noStrike" spc="-1" dirty="0" err="1">
+                <a:solidFill>
+                  <a:srgbClr val="F4DCE1"/>
+                </a:solidFill>
+                <a:uFill>
+                  <a:solidFill>
+                    <a:srgbClr val="FFFFFF"/>
+                  </a:solidFill>
+                </a:uFill>
+                <a:latin typeface="Arial"/>
+              </a:rPr>
+              <a:t>were</a:t>
+            </a:r>
+            <a:r>
+              <a:rPr lang="fr-CH" sz="1800" b="0" strike="noStrike" spc="-1" dirty="0">
+                <a:solidFill>
+                  <a:srgbClr val="F4DCE1"/>
+                </a:solidFill>
+                <a:uFill>
+                  <a:solidFill>
+                    <a:srgbClr val="FFFFFF"/>
+                  </a:solidFill>
+                </a:uFill>
+                <a:latin typeface="Arial"/>
+              </a:rPr>
+              <a:t> able to </a:t>
+            </a:r>
+            <a:r>
+              <a:rPr lang="fr-CH" sz="1800" b="0" strike="noStrike" spc="-1" dirty="0" err="1">
+                <a:solidFill>
+                  <a:srgbClr val="F4DCE1"/>
+                </a:solidFill>
+                <a:uFill>
+                  <a:solidFill>
+                    <a:srgbClr val="FFFFFF"/>
+                  </a:solidFill>
+                </a:uFill>
+                <a:latin typeface="Arial"/>
+              </a:rPr>
+              <a:t>compute</a:t>
+            </a:r>
+            <a:r>
+              <a:rPr lang="fr-CH" sz="1800" b="0" strike="noStrike" spc="-1" dirty="0">
+                <a:solidFill>
+                  <a:srgbClr val="F4DCE1"/>
+                </a:solidFill>
+                <a:uFill>
+                  <a:solidFill>
+                    <a:srgbClr val="FFFFFF"/>
+                  </a:solidFill>
+                </a:uFill>
+                <a:latin typeface="Arial"/>
+              </a:rPr>
+              <a:t> how </a:t>
+            </a:r>
+            <a:r>
+              <a:rPr lang="fr-CH" sz="1800" b="0" strike="noStrike" spc="-1" dirty="0" err="1">
+                <a:solidFill>
+                  <a:srgbClr val="F4DCE1"/>
+                </a:solidFill>
+                <a:uFill>
+                  <a:solidFill>
+                    <a:srgbClr val="FFFFFF"/>
+                  </a:solidFill>
+                </a:uFill>
+                <a:latin typeface="Arial"/>
+              </a:rPr>
+              <a:t>much</a:t>
+            </a:r>
+            <a:r>
+              <a:rPr lang="fr-CH" sz="1800" b="0" strike="noStrike" spc="-1" dirty="0">
+                <a:solidFill>
+                  <a:srgbClr val="F4DCE1"/>
+                </a:solidFill>
+                <a:uFill>
+                  <a:solidFill>
+                    <a:srgbClr val="FFFFFF"/>
+                  </a:solidFill>
+                </a:uFill>
+                <a:latin typeface="Arial"/>
+              </a:rPr>
+              <a:t> the </a:t>
+            </a:r>
+            <a:r>
+              <a:rPr lang="fr-CH" sz="1800" b="0" strike="noStrike" spc="-1" dirty="0" err="1">
+                <a:solidFill>
+                  <a:srgbClr val="F4DCE1"/>
+                </a:solidFill>
+                <a:uFill>
+                  <a:solidFill>
+                    <a:srgbClr val="FFFFFF"/>
+                  </a:solidFill>
+                </a:uFill>
+                <a:latin typeface="Arial"/>
+              </a:rPr>
+              <a:t>products</a:t>
+            </a:r>
+            <a:r>
+              <a:rPr lang="fr-CH" sz="1800" b="0" strike="noStrike" spc="-1" dirty="0">
+                <a:solidFill>
+                  <a:srgbClr val="F4DCE1"/>
+                </a:solidFill>
+                <a:uFill>
+                  <a:solidFill>
+                    <a:srgbClr val="FFFFFF"/>
+                  </a:solidFill>
+                </a:uFill>
+                <a:latin typeface="Arial"/>
+              </a:rPr>
+              <a:t> </a:t>
+            </a:r>
+            <a:r>
+              <a:rPr lang="fr-CH" sz="1800" b="0" strike="noStrike" spc="-1" dirty="0" err="1">
+                <a:solidFill>
+                  <a:srgbClr val="F4DCE1"/>
+                </a:solidFill>
+                <a:uFill>
+                  <a:solidFill>
+                    <a:srgbClr val="FFFFFF"/>
+                  </a:solidFill>
+                </a:uFill>
+                <a:latin typeface="Arial"/>
+              </a:rPr>
+              <a:t>travel</a:t>
+            </a:r>
+            <a:r>
+              <a:rPr lang="fr-CH" sz="1800" b="0" strike="noStrike" spc="-1" dirty="0">
+                <a:solidFill>
+                  <a:srgbClr val="F4DCE1"/>
+                </a:solidFill>
+                <a:uFill>
+                  <a:solidFill>
+                    <a:srgbClr val="FFFFFF"/>
+                  </a:solidFill>
+                </a:uFill>
+                <a:latin typeface="Arial"/>
+              </a:rPr>
+              <a:t>. </a:t>
+            </a:r>
+          </a:p>
+          <a:p>
+            <a:pPr algn="just"/>
+            <a:endParaRPr lang="fr-CH" sz="1800" b="0" strike="noStrike" spc="-1" dirty="0">
               <a:solidFill>
-                <a:srgbClr val="f4dce1"/>
+                <a:srgbClr val="F4DCE1"/>
               </a:solidFill>
               <a:uFill>
                 <a:solidFill>
-                  <a:srgbClr val="ffffff"/>
-                </a:solidFill>
-              </a:uFill>
-              <a:latin typeface="Arial"/>
-            </a:endParaRPr>
-          </a:p>
-          <a:p>
-            <a:pPr algn="just"/>
-            <a:endParaRPr b="0" lang="fr-CH" sz="1800" spc="-1" strike="noStrike">
-              <a:solidFill>
-                <a:srgbClr val="f4dce1"/>
-              </a:solidFill>
-              <a:uFill>
-                <a:solidFill>
-                  <a:srgbClr val="ffffff"/>
+                  <a:srgbClr val="FFFFFF"/>
                 </a:solidFill>
               </a:uFill>
               <a:latin typeface="Arial"/>
@@ -2681,7 +3279,7 @@
       </p:sp>
       <p:pic>
         <p:nvPicPr>
-          <p:cNvPr id="46" name="" descr=""/>
+          <p:cNvPr id="46" name="Image 45"/>
           <p:cNvPicPr/>
           <p:nvPr/>
         </p:nvPicPr>
@@ -2692,50 +3290,6 @@
           <a:xfrm>
             <a:off x="36000" y="-1800"/>
             <a:ext cx="3819240" cy="1837800"/>
-          </a:xfrm>
-          <a:prstGeom prst="rect">
-            <a:avLst/>
-          </a:prstGeom>
-          <a:ln>
-            <a:noFill/>
-          </a:ln>
-        </p:spPr>
-      </p:pic>
-      <p:pic>
-        <p:nvPicPr>
-          <p:cNvPr id="47" name="" descr=""/>
-          <p:cNvPicPr/>
-          <p:nvPr/>
-        </p:nvPicPr>
-        <p:blipFill>
-          <a:blip r:embed="rId3"/>
-        </p:blipFill>
-        <p:spPr>
-          <a:xfrm>
-            <a:off x="9620640" y="360000"/>
-            <a:ext cx="5211360" cy="2540880"/>
-          </a:xfrm>
-          <a:prstGeom prst="rect">
-            <a:avLst/>
-          </a:prstGeom>
-          <a:ln>
-            <a:noFill/>
-          </a:ln>
-        </p:spPr>
-      </p:pic>
-      <p:pic>
-        <p:nvPicPr>
-          <p:cNvPr id="48" name="" descr=""/>
-          <p:cNvPicPr/>
-          <p:nvPr/>
-        </p:nvPicPr>
-        <p:blipFill>
-          <a:blip r:embed="rId4"/>
-        </p:blipFill>
-        <p:spPr>
-          <a:xfrm>
-            <a:off x="4213800" y="1990080"/>
-            <a:ext cx="4570200" cy="3260880"/>
           </a:xfrm>
           <a:prstGeom prst="rect">
             <a:avLst/>
@@ -2765,30 +3319,45 @@
           </a:ln>
         </p:spPr>
         <p:txBody>
-          <a:bodyPr lIns="90000" rIns="90000" tIns="45000" bIns="45000"/>
+          <a:bodyPr lIns="90000" tIns="45000" rIns="90000" bIns="45000"/>
+          <a:lstStyle/>
           <a:p>
             <a:pPr algn="just"/>
             <a:r>
-              <a:rPr b="1" lang="fr-CH" sz="1800" spc="-1" strike="noStrike" u="sng">
-                <a:solidFill>
-                  <a:srgbClr val="f4dce1"/>
-                </a:solidFill>
-                <a:uFill>
-                  <a:solidFill>
-                    <a:srgbClr val="ffffff"/>
-                  </a:solidFill>
-                </a:uFill>
-                <a:latin typeface="Arial"/>
-              </a:rPr>
-              <a:t>Distance by category</a:t>
-            </a:r>
-            <a:endParaRPr b="0" lang="fr-CH" sz="1800" spc="-1" strike="noStrike">
+              <a:rPr lang="fr-CH" sz="1800" b="1" u="sng" strike="noStrike" spc="-1" dirty="0">
+                <a:solidFill>
+                  <a:srgbClr val="F4DCE1"/>
+                </a:solidFill>
+                <a:uFill>
+                  <a:solidFill>
+                    <a:srgbClr val="FFFFFF"/>
+                  </a:solidFill>
+                </a:uFill>
+                <a:latin typeface="Arial"/>
+              </a:rPr>
+              <a:t>Distance by </a:t>
+            </a:r>
+            <a:r>
+              <a:rPr lang="fr-CH" sz="1800" b="1" u="sng" strike="noStrike" spc="-1" dirty="0" err="1">
+                <a:solidFill>
+                  <a:srgbClr val="F4DCE1"/>
+                </a:solidFill>
+                <a:uFill>
+                  <a:solidFill>
+                    <a:srgbClr val="FFFFFF"/>
+                  </a:solidFill>
+                </a:uFill>
+                <a:latin typeface="Arial"/>
+              </a:rPr>
+              <a:t>category</a:t>
+            </a:r>
+            <a:endParaRPr lang="fr-CH" sz="1800" b="0" strike="noStrike" spc="-1" dirty="0">
               <a:solidFill>
-                <a:srgbClr val="f4dce1"/>
+                <a:srgbClr val="F4DCE1"/>
               </a:solidFill>
               <a:uFill>
                 <a:solidFill>
-                  <a:srgbClr val="ffffff"/>
+                  <a:srgbClr val="FFFFFF"/>
                 </a:solidFill>
               </a:uFill>
               <a:latin typeface="Arial"/>
@@ -2797,35 +3366,1392 @@
           <a:p>
             <a:pPr algn="just"/>
             <a:r>
-              <a:rPr b="0" lang="fr-CH" sz="1800" spc="-1" strike="noStrike">
-                <a:solidFill>
-                  <a:srgbClr val="f4dce1"/>
-                </a:solidFill>
-                <a:uFill>
-                  <a:solidFill>
-                    <a:srgbClr val="ffffff"/>
-                  </a:solidFill>
-                </a:uFill>
-                <a:latin typeface="Arial"/>
-              </a:rPr>
-              <a:t>By looking into distance by category we can see what type of products tend to travel a bit less. </a:t>
-            </a:r>
-            <a:endParaRPr b="0" lang="fr-CH" sz="1800" spc="-1" strike="noStrike">
+              <a:rPr lang="fr-CH" sz="1800" b="0" strike="noStrike" spc="-1" dirty="0">
+                <a:solidFill>
+                  <a:srgbClr val="F4DCE1"/>
+                </a:solidFill>
+                <a:uFill>
+                  <a:solidFill>
+                    <a:srgbClr val="FFFFFF"/>
+                  </a:solidFill>
+                </a:uFill>
+                <a:latin typeface="Arial"/>
+              </a:rPr>
+              <a:t>By </a:t>
+            </a:r>
+            <a:r>
+              <a:rPr lang="fr-CH" sz="1800" b="0" strike="noStrike" spc="-1" dirty="0" err="1">
+                <a:solidFill>
+                  <a:srgbClr val="F4DCE1"/>
+                </a:solidFill>
+                <a:uFill>
+                  <a:solidFill>
+                    <a:srgbClr val="FFFFFF"/>
+                  </a:solidFill>
+                </a:uFill>
+                <a:latin typeface="Arial"/>
+              </a:rPr>
+              <a:t>looking</a:t>
+            </a:r>
+            <a:r>
+              <a:rPr lang="fr-CH" sz="1800" b="0" strike="noStrike" spc="-1" dirty="0">
+                <a:solidFill>
+                  <a:srgbClr val="F4DCE1"/>
+                </a:solidFill>
+                <a:uFill>
+                  <a:solidFill>
+                    <a:srgbClr val="FFFFFF"/>
+                  </a:solidFill>
+                </a:uFill>
+                <a:latin typeface="Arial"/>
+              </a:rPr>
+              <a:t> </a:t>
+            </a:r>
+            <a:r>
+              <a:rPr lang="fr-CH" sz="1800" b="0" strike="noStrike" spc="-1" dirty="0" err="1">
+                <a:solidFill>
+                  <a:srgbClr val="F4DCE1"/>
+                </a:solidFill>
+                <a:uFill>
+                  <a:solidFill>
+                    <a:srgbClr val="FFFFFF"/>
+                  </a:solidFill>
+                </a:uFill>
+                <a:latin typeface="Arial"/>
+              </a:rPr>
+              <a:t>into</a:t>
+            </a:r>
+            <a:r>
+              <a:rPr lang="fr-CH" sz="1800" b="0" strike="noStrike" spc="-1" dirty="0">
+                <a:solidFill>
+                  <a:srgbClr val="F4DCE1"/>
+                </a:solidFill>
+                <a:uFill>
+                  <a:solidFill>
+                    <a:srgbClr val="FFFFFF"/>
+                  </a:solidFill>
+                </a:uFill>
+                <a:latin typeface="Arial"/>
+              </a:rPr>
+              <a:t> distance by </a:t>
+            </a:r>
+            <a:r>
+              <a:rPr lang="fr-CH" sz="1800" b="0" strike="noStrike" spc="-1" dirty="0" err="1">
+                <a:solidFill>
+                  <a:srgbClr val="F4DCE1"/>
+                </a:solidFill>
+                <a:uFill>
+                  <a:solidFill>
+                    <a:srgbClr val="FFFFFF"/>
+                  </a:solidFill>
+                </a:uFill>
+                <a:latin typeface="Arial"/>
+              </a:rPr>
+              <a:t>category</a:t>
+            </a:r>
+            <a:r>
+              <a:rPr lang="fr-CH" sz="1800" b="0" strike="noStrike" spc="-1" dirty="0">
+                <a:solidFill>
+                  <a:srgbClr val="F4DCE1"/>
+                </a:solidFill>
+                <a:uFill>
+                  <a:solidFill>
+                    <a:srgbClr val="FFFFFF"/>
+                  </a:solidFill>
+                </a:uFill>
+                <a:latin typeface="Arial"/>
+              </a:rPr>
+              <a:t> </a:t>
+            </a:r>
+            <a:r>
+              <a:rPr lang="fr-CH" sz="1800" b="0" strike="noStrike" spc="-1" dirty="0" err="1">
+                <a:solidFill>
+                  <a:srgbClr val="F4DCE1"/>
+                </a:solidFill>
+                <a:uFill>
+                  <a:solidFill>
+                    <a:srgbClr val="FFFFFF"/>
+                  </a:solidFill>
+                </a:uFill>
+                <a:latin typeface="Arial"/>
+              </a:rPr>
+              <a:t>we</a:t>
+            </a:r>
+            <a:r>
+              <a:rPr lang="fr-CH" sz="1800" b="0" strike="noStrike" spc="-1" dirty="0">
+                <a:solidFill>
+                  <a:srgbClr val="F4DCE1"/>
+                </a:solidFill>
+                <a:uFill>
+                  <a:solidFill>
+                    <a:srgbClr val="FFFFFF"/>
+                  </a:solidFill>
+                </a:uFill>
+                <a:latin typeface="Arial"/>
+              </a:rPr>
+              <a:t> can </a:t>
+            </a:r>
+            <a:r>
+              <a:rPr lang="fr-CH" sz="1800" b="0" strike="noStrike" spc="-1" dirty="0" err="1">
+                <a:solidFill>
+                  <a:srgbClr val="F4DCE1"/>
+                </a:solidFill>
+                <a:uFill>
+                  <a:solidFill>
+                    <a:srgbClr val="FFFFFF"/>
+                  </a:solidFill>
+                </a:uFill>
+                <a:latin typeface="Arial"/>
+              </a:rPr>
+              <a:t>see</a:t>
+            </a:r>
+            <a:r>
+              <a:rPr lang="fr-CH" sz="1800" b="0" strike="noStrike" spc="-1" dirty="0">
+                <a:solidFill>
+                  <a:srgbClr val="F4DCE1"/>
+                </a:solidFill>
+                <a:uFill>
+                  <a:solidFill>
+                    <a:srgbClr val="FFFFFF"/>
+                  </a:solidFill>
+                </a:uFill>
+                <a:latin typeface="Arial"/>
+              </a:rPr>
+              <a:t> </a:t>
+            </a:r>
+            <a:r>
+              <a:rPr lang="fr-CH" sz="1800" b="0" strike="noStrike" spc="-1" dirty="0" err="1">
+                <a:solidFill>
+                  <a:srgbClr val="F4DCE1"/>
+                </a:solidFill>
+                <a:uFill>
+                  <a:solidFill>
+                    <a:srgbClr val="FFFFFF"/>
+                  </a:solidFill>
+                </a:uFill>
+                <a:latin typeface="Arial"/>
+              </a:rPr>
+              <a:t>what</a:t>
+            </a:r>
+            <a:r>
+              <a:rPr lang="fr-CH" sz="1800" b="0" strike="noStrike" spc="-1" dirty="0">
+                <a:solidFill>
+                  <a:srgbClr val="F4DCE1"/>
+                </a:solidFill>
+                <a:uFill>
+                  <a:solidFill>
+                    <a:srgbClr val="FFFFFF"/>
+                  </a:solidFill>
+                </a:uFill>
+                <a:latin typeface="Arial"/>
+              </a:rPr>
+              <a:t> type of </a:t>
+            </a:r>
+            <a:r>
+              <a:rPr lang="fr-CH" sz="1800" b="0" strike="noStrike" spc="-1" dirty="0" err="1">
+                <a:solidFill>
+                  <a:srgbClr val="F4DCE1"/>
+                </a:solidFill>
+                <a:uFill>
+                  <a:solidFill>
+                    <a:srgbClr val="FFFFFF"/>
+                  </a:solidFill>
+                </a:uFill>
+                <a:latin typeface="Arial"/>
+              </a:rPr>
+              <a:t>products</a:t>
+            </a:r>
+            <a:r>
+              <a:rPr lang="fr-CH" sz="1800" b="0" strike="noStrike" spc="-1" dirty="0">
+                <a:solidFill>
+                  <a:srgbClr val="F4DCE1"/>
+                </a:solidFill>
+                <a:uFill>
+                  <a:solidFill>
+                    <a:srgbClr val="FFFFFF"/>
+                  </a:solidFill>
+                </a:uFill>
+                <a:latin typeface="Arial"/>
+              </a:rPr>
+              <a:t> tend to </a:t>
+            </a:r>
+            <a:r>
+              <a:rPr lang="fr-CH" sz="1800" b="0" strike="noStrike" spc="-1" dirty="0" err="1">
+                <a:solidFill>
+                  <a:srgbClr val="F4DCE1"/>
+                </a:solidFill>
+                <a:uFill>
+                  <a:solidFill>
+                    <a:srgbClr val="FFFFFF"/>
+                  </a:solidFill>
+                </a:uFill>
+                <a:latin typeface="Arial"/>
+              </a:rPr>
+              <a:t>travel</a:t>
+            </a:r>
+            <a:r>
+              <a:rPr lang="fr-CH" sz="1800" b="0" strike="noStrike" spc="-1" dirty="0">
+                <a:solidFill>
+                  <a:srgbClr val="F4DCE1"/>
+                </a:solidFill>
+                <a:uFill>
+                  <a:solidFill>
+                    <a:srgbClr val="FFFFFF"/>
+                  </a:solidFill>
+                </a:uFill>
+                <a:latin typeface="Arial"/>
+              </a:rPr>
+              <a:t> a bit </a:t>
+            </a:r>
+            <a:r>
+              <a:rPr lang="fr-CH" sz="1800" b="0" strike="noStrike" spc="-1" dirty="0" err="1">
+                <a:solidFill>
+                  <a:srgbClr val="F4DCE1"/>
+                </a:solidFill>
+                <a:uFill>
+                  <a:solidFill>
+                    <a:srgbClr val="FFFFFF"/>
+                  </a:solidFill>
+                </a:uFill>
+                <a:latin typeface="Arial"/>
+              </a:rPr>
+              <a:t>less</a:t>
+            </a:r>
+            <a:r>
+              <a:rPr lang="fr-CH" sz="1800" b="0" strike="noStrike" spc="-1" dirty="0">
+                <a:solidFill>
+                  <a:srgbClr val="F4DCE1"/>
+                </a:solidFill>
+                <a:uFill>
+                  <a:solidFill>
+                    <a:srgbClr val="FFFFFF"/>
+                  </a:solidFill>
+                </a:uFill>
+                <a:latin typeface="Arial"/>
+              </a:rPr>
+              <a:t>. </a:t>
+            </a:r>
+          </a:p>
+        </p:txBody>
+      </p:sp>
+      <p:pic>
+        <p:nvPicPr>
+          <p:cNvPr id="3" name="Graphique 2">
+            <a:extLst>
+              <a:ext uri="{FF2B5EF4-FFF2-40B4-BE49-F238E27FC236}">
+                <a16:creationId xmlns:a16="http://schemas.microsoft.com/office/drawing/2014/main" id="{D03F437D-0CBA-4779-85AD-0029789AF4EF}"/>
+              </a:ext>
+            </a:extLst>
+          </p:cNvPr>
+          <p:cNvPicPr>
+            <a:picLocks noChangeAspect="1"/>
+          </p:cNvPicPr>
+          <p:nvPr/>
+        </p:nvPicPr>
+        <p:blipFill>
+          <a:blip r:embed="rId3">
+            <a:alphaModFix amt="45000"/>
+            <a:extLst>
+              <a:ext uri="{28A0092B-C50C-407E-A947-70E740481C1C}">
+                <a14:useLocalDpi xmlns:a14="http://schemas.microsoft.com/office/drawing/2010/main" val="0"/>
+              </a:ext>
+              <a:ext uri="{96DAC541-7B7A-43D3-8B79-37D633B846F1}">
+                <asvg:svgBlip xmlns:asvg="http://schemas.microsoft.com/office/drawing/2016/SVG/main" r:embed="rId4"/>
+              </a:ext>
+            </a:extLst>
+          </a:blip>
+          <a:stretch>
+            <a:fillRect/>
+          </a:stretch>
+        </p:blipFill>
+        <p:spPr>
+          <a:xfrm>
+            <a:off x="36000" y="11102658"/>
+            <a:ext cx="14939350" cy="10342627"/>
+          </a:xfrm>
+          <a:prstGeom prst="rect">
+            <a:avLst/>
+          </a:prstGeom>
+          <a:effectLst>
+            <a:outerShdw blurRad="50800" dist="50800" dir="5400000" algn="ctr" rotWithShape="0">
+              <a:srgbClr val="000000">
+                <a:alpha val="99000"/>
+              </a:srgbClr>
+            </a:outerShdw>
+          </a:effectLst>
+        </p:spPr>
+      </p:pic>
+      <p:pic>
+        <p:nvPicPr>
+          <p:cNvPr id="7" name="Graphique 6">
+            <a:extLst>
+              <a:ext uri="{FF2B5EF4-FFF2-40B4-BE49-F238E27FC236}">
+                <a16:creationId xmlns:a16="http://schemas.microsoft.com/office/drawing/2014/main" id="{E6680E2D-D9D2-413F-9FFF-249307865F60}"/>
+              </a:ext>
+            </a:extLst>
+          </p:cNvPr>
+          <p:cNvPicPr>
+            <a:picLocks noChangeAspect="1"/>
+          </p:cNvPicPr>
+          <p:nvPr/>
+        </p:nvPicPr>
+        <p:blipFill>
+          <a:blip r:embed="rId5">
+            <a:extLst>
+              <a:ext uri="{28A0092B-C50C-407E-A947-70E740481C1C}">
+                <a14:useLocalDpi xmlns:a14="http://schemas.microsoft.com/office/drawing/2010/main" val="0"/>
+              </a:ext>
+              <a:ext uri="{96DAC541-7B7A-43D3-8B79-37D633B846F1}">
+                <asvg:svgBlip xmlns:asvg="http://schemas.microsoft.com/office/drawing/2016/SVG/main" r:embed="rId6"/>
+              </a:ext>
+            </a:extLst>
+          </a:blip>
+          <a:stretch>
+            <a:fillRect/>
+          </a:stretch>
+        </p:blipFill>
+        <p:spPr>
+          <a:xfrm>
+            <a:off x="4267509" y="1965012"/>
+            <a:ext cx="4392000" cy="3129748"/>
+          </a:xfrm>
+          <a:prstGeom prst="rect">
+            <a:avLst/>
+          </a:prstGeom>
+        </p:spPr>
+      </p:pic>
+      <p:sp>
+        <p:nvSpPr>
+          <p:cNvPr id="12" name="ZoneTexte 11">
+            <a:extLst>
+              <a:ext uri="{FF2B5EF4-FFF2-40B4-BE49-F238E27FC236}">
+                <a16:creationId xmlns:a16="http://schemas.microsoft.com/office/drawing/2014/main" id="{5E9124A8-3B46-465E-A36A-F309DC791235}"/>
+              </a:ext>
+            </a:extLst>
+          </p:cNvPr>
+          <p:cNvSpPr txBox="1"/>
+          <p:nvPr/>
+        </p:nvSpPr>
+        <p:spPr>
+          <a:xfrm>
+            <a:off x="9556491" y="267358"/>
+            <a:ext cx="4392000" cy="1846659"/>
+          </a:xfrm>
+          <a:prstGeom prst="rect">
+            <a:avLst/>
+          </a:prstGeom>
+          <a:noFill/>
+        </p:spPr>
+        <p:txBody>
+          <a:bodyPr wrap="square" rtlCol="0">
+            <a:spAutoFit/>
+          </a:bodyPr>
+          <a:lstStyle/>
+          <a:p>
+            <a:pPr algn="just"/>
+            <a:r>
+              <a:rPr lang="fr-CH" sz="2400" b="1" u="sng" spc="-1" dirty="0">
+                <a:solidFill>
+                  <a:srgbClr val="F4DCE1"/>
+                </a:solidFill>
+                <a:uFill>
+                  <a:solidFill>
+                    <a:srgbClr val="FFFFFF"/>
+                  </a:solidFill>
+                </a:uFill>
+              </a:rPr>
+              <a:t>Palm </a:t>
+            </a:r>
+            <a:r>
+              <a:rPr lang="fr-CH" sz="2400" b="1" u="sng" spc="-1" dirty="0" err="1">
+                <a:solidFill>
+                  <a:srgbClr val="F4DCE1"/>
+                </a:solidFill>
+                <a:uFill>
+                  <a:solidFill>
+                    <a:srgbClr val="FFFFFF"/>
+                  </a:solidFill>
+                </a:uFill>
+              </a:rPr>
+              <a:t>oil</a:t>
+            </a:r>
+            <a:endParaRPr lang="fr-CH" sz="2400" spc="-1" dirty="0">
               <a:solidFill>
-                <a:srgbClr val="f4dce1"/>
+                <a:srgbClr val="F4DCE1"/>
               </a:solidFill>
               <a:uFill>
                 <a:solidFill>
-                  <a:srgbClr val="ffffff"/>
+                  <a:srgbClr val="FFFFFF"/>
                 </a:solidFill>
               </a:uFill>
-              <a:latin typeface="Arial"/>
             </a:endParaRPr>
+          </a:p>
+          <a:p>
+            <a:pPr algn="just"/>
+            <a:r>
+              <a:rPr lang="fr-CH" spc="-1" dirty="0">
+                <a:solidFill>
+                  <a:srgbClr val="F4DCE1"/>
+                </a:solidFill>
+                <a:uFill>
+                  <a:solidFill>
+                    <a:srgbClr val="FFFFFF"/>
+                  </a:solidFill>
+                </a:uFill>
+              </a:rPr>
+              <a:t>As </a:t>
+            </a:r>
+            <a:r>
+              <a:rPr lang="fr-CH" spc="-1" dirty="0" err="1">
+                <a:solidFill>
+                  <a:srgbClr val="F4DCE1"/>
+                </a:solidFill>
+                <a:uFill>
+                  <a:solidFill>
+                    <a:srgbClr val="FFFFFF"/>
+                  </a:solidFill>
+                </a:uFill>
+              </a:rPr>
+              <a:t>we</a:t>
+            </a:r>
+            <a:r>
+              <a:rPr lang="fr-CH" spc="-1" dirty="0">
+                <a:solidFill>
+                  <a:srgbClr val="F4DCE1"/>
+                </a:solidFill>
+                <a:uFill>
+                  <a:solidFill>
+                    <a:srgbClr val="FFFFFF"/>
+                  </a:solidFill>
+                </a:uFill>
+              </a:rPr>
+              <a:t> know </a:t>
+            </a:r>
+            <a:r>
+              <a:rPr lang="fr-CH" spc="-1" dirty="0" err="1">
+                <a:solidFill>
+                  <a:srgbClr val="F4DCE1"/>
+                </a:solidFill>
+                <a:uFill>
+                  <a:solidFill>
+                    <a:srgbClr val="FFFFFF"/>
+                  </a:solidFill>
+                </a:uFill>
+              </a:rPr>
+              <a:t>already</a:t>
+            </a:r>
+            <a:r>
+              <a:rPr lang="fr-CH" spc="-1" dirty="0">
+                <a:solidFill>
+                  <a:srgbClr val="F4DCE1"/>
+                </a:solidFill>
+                <a:uFill>
+                  <a:solidFill>
+                    <a:srgbClr val="FFFFFF"/>
+                  </a:solidFill>
+                </a:uFill>
+              </a:rPr>
+              <a:t>, palm </a:t>
+            </a:r>
+            <a:r>
+              <a:rPr lang="fr-CH" spc="-1" dirty="0" err="1">
+                <a:solidFill>
+                  <a:srgbClr val="F4DCE1"/>
+                </a:solidFill>
+                <a:uFill>
+                  <a:solidFill>
+                    <a:srgbClr val="FFFFFF"/>
+                  </a:solidFill>
+                </a:uFill>
+              </a:rPr>
+              <a:t>oil</a:t>
+            </a:r>
+            <a:r>
+              <a:rPr lang="fr-CH" spc="-1" dirty="0">
+                <a:solidFill>
+                  <a:srgbClr val="F4DCE1"/>
+                </a:solidFill>
+                <a:uFill>
+                  <a:solidFill>
+                    <a:srgbClr val="FFFFFF"/>
+                  </a:solidFill>
+                </a:uFill>
+              </a:rPr>
+              <a:t> </a:t>
+            </a:r>
+            <a:r>
+              <a:rPr lang="fr-CH" spc="-1" dirty="0" err="1">
+                <a:solidFill>
+                  <a:srgbClr val="F4DCE1"/>
+                </a:solidFill>
+                <a:uFill>
+                  <a:solidFill>
+                    <a:srgbClr val="FFFFFF"/>
+                  </a:solidFill>
+                </a:uFill>
+              </a:rPr>
+              <a:t>is</a:t>
+            </a:r>
+            <a:r>
+              <a:rPr lang="fr-CH" spc="-1" dirty="0">
+                <a:solidFill>
+                  <a:srgbClr val="F4DCE1"/>
+                </a:solidFill>
+                <a:uFill>
+                  <a:solidFill>
+                    <a:srgbClr val="FFFFFF"/>
+                  </a:solidFill>
+                </a:uFill>
+              </a:rPr>
+              <a:t> a major </a:t>
+            </a:r>
+            <a:r>
+              <a:rPr lang="fr-CH" spc="-1" dirty="0" err="1">
+                <a:solidFill>
+                  <a:srgbClr val="F4DCE1"/>
+                </a:solidFill>
+                <a:uFill>
+                  <a:solidFill>
+                    <a:srgbClr val="FFFFFF"/>
+                  </a:solidFill>
+                </a:uFill>
+              </a:rPr>
+              <a:t>reason</a:t>
+            </a:r>
+            <a:r>
+              <a:rPr lang="fr-CH" spc="-1" dirty="0">
+                <a:solidFill>
+                  <a:srgbClr val="F4DCE1"/>
+                </a:solidFill>
+                <a:uFill>
+                  <a:solidFill>
+                    <a:srgbClr val="FFFFFF"/>
+                  </a:solidFill>
+                </a:uFill>
+              </a:rPr>
+              <a:t> for </a:t>
+            </a:r>
+            <a:r>
+              <a:rPr lang="fr-CH" spc="-1" dirty="0" err="1">
+                <a:solidFill>
+                  <a:srgbClr val="F4DCE1"/>
+                </a:solidFill>
+                <a:uFill>
+                  <a:solidFill>
+                    <a:srgbClr val="FFFFFF"/>
+                  </a:solidFill>
+                </a:uFill>
+              </a:rPr>
+              <a:t>deforestation</a:t>
+            </a:r>
+            <a:r>
+              <a:rPr lang="fr-CH" spc="-1" dirty="0">
+                <a:solidFill>
+                  <a:srgbClr val="F4DCE1"/>
+                </a:solidFill>
+                <a:uFill>
+                  <a:solidFill>
+                    <a:srgbClr val="FFFFFF"/>
+                  </a:solidFill>
+                </a:uFill>
+              </a:rPr>
+              <a:t>. </a:t>
+            </a:r>
+            <a:r>
+              <a:rPr lang="fr-CH" spc="-1" dirty="0" err="1">
+                <a:solidFill>
+                  <a:srgbClr val="F4DCE1"/>
+                </a:solidFill>
+                <a:uFill>
+                  <a:solidFill>
+                    <a:srgbClr val="FFFFFF"/>
+                  </a:solidFill>
+                </a:uFill>
+              </a:rPr>
+              <a:t>Therefore</a:t>
+            </a:r>
+            <a:r>
+              <a:rPr lang="fr-CH" spc="-1" dirty="0">
+                <a:solidFill>
+                  <a:srgbClr val="F4DCE1"/>
+                </a:solidFill>
+                <a:uFill>
+                  <a:solidFill>
+                    <a:srgbClr val="FFFFFF"/>
+                  </a:solidFill>
+                </a:uFill>
+              </a:rPr>
+              <a:t> </a:t>
+            </a:r>
+            <a:r>
+              <a:rPr lang="fr-CH" spc="-1" dirty="0" err="1">
+                <a:solidFill>
+                  <a:srgbClr val="F4DCE1"/>
+                </a:solidFill>
+                <a:uFill>
+                  <a:solidFill>
+                    <a:srgbClr val="FFFFFF"/>
+                  </a:solidFill>
+                </a:uFill>
+              </a:rPr>
+              <a:t>we</a:t>
+            </a:r>
+            <a:r>
+              <a:rPr lang="fr-CH" spc="-1" dirty="0">
+                <a:solidFill>
+                  <a:srgbClr val="F4DCE1"/>
+                </a:solidFill>
+                <a:uFill>
+                  <a:solidFill>
+                    <a:srgbClr val="FFFFFF"/>
+                  </a:solidFill>
+                </a:uFill>
+              </a:rPr>
+              <a:t> analyse </a:t>
+            </a:r>
+            <a:r>
+              <a:rPr lang="fr-CH" spc="-1" dirty="0" err="1">
+                <a:solidFill>
+                  <a:srgbClr val="F4DCE1"/>
+                </a:solidFill>
+                <a:uFill>
+                  <a:solidFill>
+                    <a:srgbClr val="FFFFFF"/>
+                  </a:solidFill>
+                </a:uFill>
+              </a:rPr>
+              <a:t>what</a:t>
+            </a:r>
+            <a:r>
+              <a:rPr lang="fr-CH" spc="-1" dirty="0">
+                <a:solidFill>
+                  <a:srgbClr val="F4DCE1"/>
+                </a:solidFill>
+                <a:uFill>
+                  <a:solidFill>
+                    <a:srgbClr val="FFFFFF"/>
+                  </a:solidFill>
+                </a:uFill>
+              </a:rPr>
+              <a:t> </a:t>
+            </a:r>
+            <a:r>
+              <a:rPr lang="fr-CH" spc="-1" dirty="0" err="1">
+                <a:solidFill>
+                  <a:srgbClr val="F4DCE1"/>
+                </a:solidFill>
+                <a:uFill>
+                  <a:solidFill>
+                    <a:srgbClr val="FFFFFF"/>
+                  </a:solidFill>
+                </a:uFill>
+              </a:rPr>
+              <a:t>kind</a:t>
+            </a:r>
+            <a:r>
+              <a:rPr lang="fr-CH" spc="-1" dirty="0">
+                <a:solidFill>
+                  <a:srgbClr val="F4DCE1"/>
+                </a:solidFill>
+                <a:uFill>
+                  <a:solidFill>
+                    <a:srgbClr val="FFFFFF"/>
+                  </a:solidFill>
+                </a:uFill>
+              </a:rPr>
+              <a:t> of </a:t>
+            </a:r>
+            <a:r>
+              <a:rPr lang="fr-CH" spc="-1" dirty="0" err="1">
+                <a:solidFill>
+                  <a:srgbClr val="F4DCE1"/>
+                </a:solidFill>
+                <a:uFill>
+                  <a:solidFill>
+                    <a:srgbClr val="FFFFFF"/>
+                  </a:solidFill>
+                </a:uFill>
+              </a:rPr>
+              <a:t>products</a:t>
+            </a:r>
+            <a:r>
+              <a:rPr lang="fr-CH" spc="-1" dirty="0">
+                <a:solidFill>
+                  <a:srgbClr val="F4DCE1"/>
+                </a:solidFill>
+                <a:uFill>
+                  <a:solidFill>
+                    <a:srgbClr val="FFFFFF"/>
+                  </a:solidFill>
+                </a:uFill>
+              </a:rPr>
+              <a:t> are more </a:t>
+            </a:r>
+            <a:r>
+              <a:rPr lang="fr-CH" spc="-1" dirty="0" err="1">
+                <a:solidFill>
+                  <a:srgbClr val="F4DCE1"/>
+                </a:solidFill>
+                <a:uFill>
+                  <a:solidFill>
+                    <a:srgbClr val="FFFFFF"/>
+                  </a:solidFill>
+                </a:uFill>
+              </a:rPr>
+              <a:t>likely</a:t>
+            </a:r>
+            <a:r>
+              <a:rPr lang="fr-CH" spc="-1" dirty="0">
+                <a:solidFill>
+                  <a:srgbClr val="F4DCE1"/>
+                </a:solidFill>
+                <a:uFill>
+                  <a:solidFill>
+                    <a:srgbClr val="FFFFFF"/>
+                  </a:solidFill>
+                </a:uFill>
+              </a:rPr>
+              <a:t> to </a:t>
+            </a:r>
+            <a:r>
+              <a:rPr lang="fr-CH" spc="-1" dirty="0" err="1">
+                <a:solidFill>
+                  <a:srgbClr val="F4DCE1"/>
+                </a:solidFill>
+                <a:uFill>
+                  <a:solidFill>
+                    <a:srgbClr val="FFFFFF"/>
+                  </a:solidFill>
+                </a:uFill>
+              </a:rPr>
+              <a:t>contain</a:t>
+            </a:r>
+            <a:r>
+              <a:rPr lang="fr-CH" spc="-1" dirty="0">
+                <a:solidFill>
+                  <a:srgbClr val="F4DCE1"/>
+                </a:solidFill>
+                <a:uFill>
+                  <a:solidFill>
+                    <a:srgbClr val="FFFFFF"/>
+                  </a:solidFill>
+                </a:uFill>
+              </a:rPr>
+              <a:t> palm </a:t>
+            </a:r>
+            <a:r>
+              <a:rPr lang="fr-CH" spc="-1" dirty="0" err="1">
+                <a:solidFill>
+                  <a:srgbClr val="F4DCE1"/>
+                </a:solidFill>
+                <a:uFill>
+                  <a:solidFill>
+                    <a:srgbClr val="FFFFFF"/>
+                  </a:solidFill>
+                </a:uFill>
+              </a:rPr>
+              <a:t>oil</a:t>
+            </a:r>
+            <a:r>
+              <a:rPr lang="fr-CH" spc="-1" dirty="0">
+                <a:solidFill>
+                  <a:srgbClr val="F4DCE1"/>
+                </a:solidFill>
+                <a:uFill>
+                  <a:solidFill>
+                    <a:srgbClr val="FFFFFF"/>
+                  </a:solidFill>
+                </a:uFill>
+              </a:rPr>
+              <a:t>.</a:t>
+            </a:r>
+          </a:p>
+          <a:p>
+            <a:endParaRPr lang="fr-CH" dirty="0"/>
+          </a:p>
+        </p:txBody>
+      </p:sp>
+      <p:pic>
+        <p:nvPicPr>
+          <p:cNvPr id="16" name="Graphique 15">
+            <a:extLst>
+              <a:ext uri="{FF2B5EF4-FFF2-40B4-BE49-F238E27FC236}">
+                <a16:creationId xmlns:a16="http://schemas.microsoft.com/office/drawing/2014/main" id="{F409B56A-95B6-43BF-A5BB-520EF256884E}"/>
+              </a:ext>
+            </a:extLst>
+          </p:cNvPr>
+          <p:cNvPicPr>
+            <a:picLocks noChangeAspect="1"/>
+          </p:cNvPicPr>
+          <p:nvPr/>
+        </p:nvPicPr>
+        <p:blipFill>
+          <a:blip r:embed="rId7">
+            <a:extLst>
+              <a:ext uri="{28A0092B-C50C-407E-A947-70E740481C1C}">
+                <a14:useLocalDpi xmlns:a14="http://schemas.microsoft.com/office/drawing/2010/main" val="0"/>
+              </a:ext>
+              <a:ext uri="{96DAC541-7B7A-43D3-8B79-37D633B846F1}">
+                <asvg:svgBlip xmlns:asvg="http://schemas.microsoft.com/office/drawing/2016/SVG/main" r:embed="rId8"/>
+              </a:ext>
+            </a:extLst>
+          </a:blip>
+          <a:stretch>
+            <a:fillRect/>
+          </a:stretch>
+        </p:blipFill>
+        <p:spPr>
+          <a:xfrm>
+            <a:off x="9732992" y="2035146"/>
+            <a:ext cx="4038997" cy="2956122"/>
+          </a:xfrm>
+          <a:prstGeom prst="rect">
+            <a:avLst/>
+          </a:prstGeom>
+        </p:spPr>
+      </p:pic>
+      <p:pic>
+        <p:nvPicPr>
+          <p:cNvPr id="18" name="Image 17">
+            <a:extLst>
+              <a:ext uri="{FF2B5EF4-FFF2-40B4-BE49-F238E27FC236}">
+                <a16:creationId xmlns:a16="http://schemas.microsoft.com/office/drawing/2014/main" id="{45229A8C-C3AB-4805-B8DC-4708F09FA16B}"/>
+              </a:ext>
+            </a:extLst>
+          </p:cNvPr>
+          <p:cNvPicPr>
+            <a:picLocks noChangeAspect="1"/>
+          </p:cNvPicPr>
+          <p:nvPr/>
+        </p:nvPicPr>
+        <p:blipFill>
+          <a:blip r:embed="rId9">
+            <a:extLst>
+              <a:ext uri="{28A0092B-C50C-407E-A947-70E740481C1C}">
+                <a14:useLocalDpi xmlns:a14="http://schemas.microsoft.com/office/drawing/2010/main" val="0"/>
+              </a:ext>
+            </a:extLst>
+          </a:blip>
+          <a:stretch>
+            <a:fillRect/>
+          </a:stretch>
+        </p:blipFill>
+        <p:spPr>
+          <a:xfrm>
+            <a:off x="4176000" y="6745394"/>
+            <a:ext cx="4392000" cy="3029718"/>
+          </a:xfrm>
+          <a:prstGeom prst="rect">
+            <a:avLst/>
+          </a:prstGeom>
+        </p:spPr>
+      </p:pic>
+      <p:pic>
+        <p:nvPicPr>
+          <p:cNvPr id="20" name="Graphique 19">
+            <a:extLst>
+              <a:ext uri="{FF2B5EF4-FFF2-40B4-BE49-F238E27FC236}">
+                <a16:creationId xmlns:a16="http://schemas.microsoft.com/office/drawing/2014/main" id="{833E8C32-C43C-4088-B285-261E53E9ECA8}"/>
+              </a:ext>
+            </a:extLst>
+          </p:cNvPr>
+          <p:cNvPicPr>
+            <a:picLocks noChangeAspect="1"/>
+          </p:cNvPicPr>
+          <p:nvPr/>
+        </p:nvPicPr>
+        <p:blipFill>
+          <a:blip r:embed="rId10">
+            <a:extLst>
+              <a:ext uri="{28A0092B-C50C-407E-A947-70E740481C1C}">
+                <a14:useLocalDpi xmlns:a14="http://schemas.microsoft.com/office/drawing/2010/main" val="0"/>
+              </a:ext>
+              <a:ext uri="{96DAC541-7B7A-43D3-8B79-37D633B846F1}">
+                <asvg:svgBlip xmlns:asvg="http://schemas.microsoft.com/office/drawing/2016/SVG/main" r:embed="rId11"/>
+              </a:ext>
+            </a:extLst>
+          </a:blip>
+          <a:stretch>
+            <a:fillRect/>
+          </a:stretch>
+        </p:blipFill>
+        <p:spPr>
+          <a:xfrm>
+            <a:off x="4179018" y="9929091"/>
+            <a:ext cx="4392000" cy="2928001"/>
+          </a:xfrm>
+          <a:prstGeom prst="rect">
+            <a:avLst/>
+          </a:prstGeom>
+        </p:spPr>
+      </p:pic>
+      <p:sp>
+        <p:nvSpPr>
+          <p:cNvPr id="21" name="ZoneTexte 20">
+            <a:extLst>
+              <a:ext uri="{FF2B5EF4-FFF2-40B4-BE49-F238E27FC236}">
+                <a16:creationId xmlns:a16="http://schemas.microsoft.com/office/drawing/2014/main" id="{A2C80346-B68C-437F-A1C2-DC0C41459C7F}"/>
+              </a:ext>
+            </a:extLst>
+          </p:cNvPr>
+          <p:cNvSpPr txBox="1"/>
+          <p:nvPr/>
+        </p:nvSpPr>
+        <p:spPr>
+          <a:xfrm>
+            <a:off x="9556491" y="5518689"/>
+            <a:ext cx="4392000" cy="1846659"/>
+          </a:xfrm>
+          <a:prstGeom prst="rect">
+            <a:avLst/>
+          </a:prstGeom>
+          <a:noFill/>
+        </p:spPr>
+        <p:txBody>
+          <a:bodyPr wrap="square" rtlCol="0">
+            <a:spAutoFit/>
+          </a:bodyPr>
+          <a:lstStyle/>
+          <a:p>
+            <a:r>
+              <a:rPr lang="fr-CH" sz="2400" b="1" u="sng" spc="-1" dirty="0" err="1">
+                <a:solidFill>
+                  <a:srgbClr val="F4DCE1"/>
+                </a:solidFill>
+                <a:uFill>
+                  <a:solidFill>
+                    <a:srgbClr val="FFFFFF"/>
+                  </a:solidFill>
+                </a:uFill>
+              </a:rPr>
+              <a:t>Vegan</a:t>
+            </a:r>
+            <a:r>
+              <a:rPr lang="fr-CH" sz="2400" b="1" u="sng" spc="-1" dirty="0">
+                <a:solidFill>
+                  <a:srgbClr val="F4DCE1"/>
+                </a:solidFill>
+                <a:uFill>
+                  <a:solidFill>
+                    <a:srgbClr val="FFFFFF"/>
+                  </a:solidFill>
+                </a:uFill>
+              </a:rPr>
+              <a:t> </a:t>
+            </a:r>
+            <a:r>
+              <a:rPr lang="fr-CH" sz="2400" b="1" u="sng" spc="-1" dirty="0" err="1">
+                <a:solidFill>
+                  <a:srgbClr val="F4DCE1"/>
+                </a:solidFill>
+                <a:uFill>
+                  <a:solidFill>
+                    <a:srgbClr val="FFFFFF"/>
+                  </a:solidFill>
+                </a:uFill>
+              </a:rPr>
+              <a:t>products</a:t>
+            </a:r>
+            <a:endParaRPr lang="fr-CH" sz="2400" b="1" u="sng" spc="-1" dirty="0">
+              <a:solidFill>
+                <a:srgbClr val="F4DCE1"/>
+              </a:solidFill>
+              <a:uFill>
+                <a:solidFill>
+                  <a:srgbClr val="FFFFFF"/>
+                </a:solidFill>
+              </a:uFill>
+            </a:endParaRPr>
+          </a:p>
+          <a:p>
+            <a:r>
+              <a:rPr lang="fr-CH" spc="-1" dirty="0">
+                <a:solidFill>
+                  <a:srgbClr val="F4DCE1"/>
+                </a:solidFill>
+                <a:uFill>
+                  <a:solidFill>
+                    <a:srgbClr val="FFFFFF"/>
+                  </a:solidFill>
+                </a:uFill>
+              </a:rPr>
+              <a:t>As </a:t>
+            </a:r>
+            <a:r>
+              <a:rPr lang="fr-CH" spc="-1" dirty="0" err="1">
+                <a:solidFill>
+                  <a:srgbClr val="F4DCE1"/>
+                </a:solidFill>
+                <a:uFill>
+                  <a:solidFill>
+                    <a:srgbClr val="FFFFFF"/>
+                  </a:solidFill>
+                </a:uFill>
+              </a:rPr>
+              <a:t>we</a:t>
+            </a:r>
+            <a:r>
+              <a:rPr lang="fr-CH" spc="-1" dirty="0">
+                <a:solidFill>
+                  <a:srgbClr val="F4DCE1"/>
+                </a:solidFill>
+                <a:uFill>
+                  <a:solidFill>
+                    <a:srgbClr val="FFFFFF"/>
+                  </a:solidFill>
+                </a:uFill>
+              </a:rPr>
+              <a:t> know </a:t>
+            </a:r>
+            <a:r>
+              <a:rPr lang="fr-CH" spc="-1" dirty="0" err="1">
+                <a:solidFill>
+                  <a:srgbClr val="F4DCE1"/>
+                </a:solidFill>
+                <a:uFill>
+                  <a:solidFill>
+                    <a:srgbClr val="FFFFFF"/>
+                  </a:solidFill>
+                </a:uFill>
+              </a:rPr>
+              <a:t>already</a:t>
+            </a:r>
+            <a:r>
+              <a:rPr lang="fr-CH" spc="-1" dirty="0">
+                <a:solidFill>
+                  <a:srgbClr val="F4DCE1"/>
+                </a:solidFill>
+                <a:uFill>
+                  <a:solidFill>
+                    <a:srgbClr val="FFFFFF"/>
+                  </a:solidFill>
+                </a:uFill>
+              </a:rPr>
+              <a:t>, palm </a:t>
+            </a:r>
+            <a:r>
+              <a:rPr lang="fr-CH" spc="-1" dirty="0" err="1">
+                <a:solidFill>
+                  <a:srgbClr val="F4DCE1"/>
+                </a:solidFill>
+                <a:uFill>
+                  <a:solidFill>
+                    <a:srgbClr val="FFFFFF"/>
+                  </a:solidFill>
+                </a:uFill>
+              </a:rPr>
+              <a:t>oil</a:t>
+            </a:r>
+            <a:r>
+              <a:rPr lang="fr-CH" spc="-1" dirty="0">
+                <a:solidFill>
+                  <a:srgbClr val="F4DCE1"/>
+                </a:solidFill>
+                <a:uFill>
+                  <a:solidFill>
+                    <a:srgbClr val="FFFFFF"/>
+                  </a:solidFill>
+                </a:uFill>
+              </a:rPr>
+              <a:t> </a:t>
+            </a:r>
+            <a:r>
+              <a:rPr lang="fr-CH" spc="-1" dirty="0" err="1">
+                <a:solidFill>
+                  <a:srgbClr val="F4DCE1"/>
+                </a:solidFill>
+                <a:uFill>
+                  <a:solidFill>
+                    <a:srgbClr val="FFFFFF"/>
+                  </a:solidFill>
+                </a:uFill>
+              </a:rPr>
+              <a:t>is</a:t>
+            </a:r>
+            <a:r>
+              <a:rPr lang="fr-CH" spc="-1" dirty="0">
+                <a:solidFill>
+                  <a:srgbClr val="F4DCE1"/>
+                </a:solidFill>
+                <a:uFill>
+                  <a:solidFill>
+                    <a:srgbClr val="FFFFFF"/>
+                  </a:solidFill>
+                </a:uFill>
+              </a:rPr>
+              <a:t> a major </a:t>
+            </a:r>
+            <a:r>
+              <a:rPr lang="fr-CH" spc="-1" dirty="0" err="1">
+                <a:solidFill>
+                  <a:srgbClr val="F4DCE1"/>
+                </a:solidFill>
+                <a:uFill>
+                  <a:solidFill>
+                    <a:srgbClr val="FFFFFF"/>
+                  </a:solidFill>
+                </a:uFill>
+              </a:rPr>
+              <a:t>reason</a:t>
+            </a:r>
+            <a:r>
+              <a:rPr lang="fr-CH" spc="-1" dirty="0">
+                <a:solidFill>
+                  <a:srgbClr val="F4DCE1"/>
+                </a:solidFill>
+                <a:uFill>
+                  <a:solidFill>
+                    <a:srgbClr val="FFFFFF"/>
+                  </a:solidFill>
+                </a:uFill>
+              </a:rPr>
+              <a:t> for </a:t>
+            </a:r>
+            <a:r>
+              <a:rPr lang="fr-CH" spc="-1" dirty="0" err="1">
+                <a:solidFill>
+                  <a:srgbClr val="F4DCE1"/>
+                </a:solidFill>
+                <a:uFill>
+                  <a:solidFill>
+                    <a:srgbClr val="FFFFFF"/>
+                  </a:solidFill>
+                </a:uFill>
+              </a:rPr>
+              <a:t>deforestation</a:t>
+            </a:r>
+            <a:r>
+              <a:rPr lang="fr-CH" spc="-1" dirty="0">
+                <a:solidFill>
+                  <a:srgbClr val="F4DCE1"/>
+                </a:solidFill>
+                <a:uFill>
+                  <a:solidFill>
+                    <a:srgbClr val="FFFFFF"/>
+                  </a:solidFill>
+                </a:uFill>
+              </a:rPr>
+              <a:t>. </a:t>
+            </a:r>
+            <a:r>
+              <a:rPr lang="fr-CH" spc="-1" dirty="0" err="1">
+                <a:solidFill>
+                  <a:srgbClr val="F4DCE1"/>
+                </a:solidFill>
+                <a:uFill>
+                  <a:solidFill>
+                    <a:srgbClr val="FFFFFF"/>
+                  </a:solidFill>
+                </a:uFill>
+              </a:rPr>
+              <a:t>Therefore</a:t>
+            </a:r>
+            <a:r>
+              <a:rPr lang="fr-CH" spc="-1" dirty="0">
+                <a:solidFill>
+                  <a:srgbClr val="F4DCE1"/>
+                </a:solidFill>
+                <a:uFill>
+                  <a:solidFill>
+                    <a:srgbClr val="FFFFFF"/>
+                  </a:solidFill>
+                </a:uFill>
+              </a:rPr>
+              <a:t> </a:t>
+            </a:r>
+            <a:r>
+              <a:rPr lang="fr-CH" spc="-1" dirty="0" err="1">
+                <a:solidFill>
+                  <a:srgbClr val="F4DCE1"/>
+                </a:solidFill>
+                <a:uFill>
+                  <a:solidFill>
+                    <a:srgbClr val="FFFFFF"/>
+                  </a:solidFill>
+                </a:uFill>
+              </a:rPr>
+              <a:t>we</a:t>
+            </a:r>
+            <a:r>
+              <a:rPr lang="fr-CH" spc="-1" dirty="0">
+                <a:solidFill>
+                  <a:srgbClr val="F4DCE1"/>
+                </a:solidFill>
+                <a:uFill>
+                  <a:solidFill>
+                    <a:srgbClr val="FFFFFF"/>
+                  </a:solidFill>
+                </a:uFill>
+              </a:rPr>
+              <a:t> analyse </a:t>
+            </a:r>
+            <a:r>
+              <a:rPr lang="fr-CH" spc="-1" dirty="0" err="1">
+                <a:solidFill>
+                  <a:srgbClr val="F4DCE1"/>
+                </a:solidFill>
+                <a:uFill>
+                  <a:solidFill>
+                    <a:srgbClr val="FFFFFF"/>
+                  </a:solidFill>
+                </a:uFill>
+              </a:rPr>
+              <a:t>what</a:t>
+            </a:r>
+            <a:r>
+              <a:rPr lang="fr-CH" spc="-1" dirty="0">
+                <a:solidFill>
+                  <a:srgbClr val="F4DCE1"/>
+                </a:solidFill>
+                <a:uFill>
+                  <a:solidFill>
+                    <a:srgbClr val="FFFFFF"/>
+                  </a:solidFill>
+                </a:uFill>
+              </a:rPr>
+              <a:t> </a:t>
+            </a:r>
+            <a:r>
+              <a:rPr lang="fr-CH" spc="-1" dirty="0" err="1">
+                <a:solidFill>
+                  <a:srgbClr val="F4DCE1"/>
+                </a:solidFill>
+                <a:uFill>
+                  <a:solidFill>
+                    <a:srgbClr val="FFFFFF"/>
+                  </a:solidFill>
+                </a:uFill>
+              </a:rPr>
+              <a:t>kind</a:t>
+            </a:r>
+            <a:r>
+              <a:rPr lang="fr-CH" spc="-1" dirty="0">
+                <a:solidFill>
+                  <a:srgbClr val="F4DCE1"/>
+                </a:solidFill>
+                <a:uFill>
+                  <a:solidFill>
+                    <a:srgbClr val="FFFFFF"/>
+                  </a:solidFill>
+                </a:uFill>
+              </a:rPr>
+              <a:t> of </a:t>
+            </a:r>
+            <a:r>
+              <a:rPr lang="fr-CH" spc="-1" dirty="0" err="1">
+                <a:solidFill>
+                  <a:srgbClr val="F4DCE1"/>
+                </a:solidFill>
+                <a:uFill>
+                  <a:solidFill>
+                    <a:srgbClr val="FFFFFF"/>
+                  </a:solidFill>
+                </a:uFill>
+              </a:rPr>
+              <a:t>products</a:t>
+            </a:r>
+            <a:r>
+              <a:rPr lang="fr-CH" spc="-1" dirty="0">
+                <a:solidFill>
+                  <a:srgbClr val="F4DCE1"/>
+                </a:solidFill>
+                <a:uFill>
+                  <a:solidFill>
+                    <a:srgbClr val="FFFFFF"/>
+                  </a:solidFill>
+                </a:uFill>
+              </a:rPr>
+              <a:t> are more </a:t>
+            </a:r>
+            <a:r>
+              <a:rPr lang="fr-CH" spc="-1" dirty="0" err="1">
+                <a:solidFill>
+                  <a:srgbClr val="F4DCE1"/>
+                </a:solidFill>
+                <a:uFill>
+                  <a:solidFill>
+                    <a:srgbClr val="FFFFFF"/>
+                  </a:solidFill>
+                </a:uFill>
+              </a:rPr>
+              <a:t>likely</a:t>
+            </a:r>
+            <a:r>
+              <a:rPr lang="fr-CH" spc="-1" dirty="0">
+                <a:solidFill>
+                  <a:srgbClr val="F4DCE1"/>
+                </a:solidFill>
+                <a:uFill>
+                  <a:solidFill>
+                    <a:srgbClr val="FFFFFF"/>
+                  </a:solidFill>
+                </a:uFill>
+              </a:rPr>
+              <a:t> to </a:t>
+            </a:r>
+            <a:r>
+              <a:rPr lang="fr-CH" spc="-1" dirty="0" err="1">
+                <a:solidFill>
+                  <a:srgbClr val="F4DCE1"/>
+                </a:solidFill>
+                <a:uFill>
+                  <a:solidFill>
+                    <a:srgbClr val="FFFFFF"/>
+                  </a:solidFill>
+                </a:uFill>
+              </a:rPr>
+              <a:t>contain</a:t>
+            </a:r>
+            <a:r>
+              <a:rPr lang="fr-CH" spc="-1" dirty="0">
+                <a:solidFill>
+                  <a:srgbClr val="F4DCE1"/>
+                </a:solidFill>
+                <a:uFill>
+                  <a:solidFill>
+                    <a:srgbClr val="FFFFFF"/>
+                  </a:solidFill>
+                </a:uFill>
+              </a:rPr>
+              <a:t> palm </a:t>
+            </a:r>
+            <a:r>
+              <a:rPr lang="fr-CH" spc="-1" dirty="0" err="1">
+                <a:solidFill>
+                  <a:srgbClr val="F4DCE1"/>
+                </a:solidFill>
+                <a:uFill>
+                  <a:solidFill>
+                    <a:srgbClr val="FFFFFF"/>
+                  </a:solidFill>
+                </a:uFill>
+              </a:rPr>
+              <a:t>oil</a:t>
+            </a:r>
+            <a:r>
+              <a:rPr lang="fr-CH" spc="-1" dirty="0">
+                <a:solidFill>
+                  <a:srgbClr val="F4DCE1"/>
+                </a:solidFill>
+                <a:uFill>
+                  <a:solidFill>
+                    <a:srgbClr val="FFFFFF"/>
+                  </a:solidFill>
+                </a:uFill>
+              </a:rPr>
+              <a:t>.</a:t>
+            </a:r>
+          </a:p>
+          <a:p>
+            <a:endParaRPr lang="fr-CH" dirty="0"/>
           </a:p>
         </p:txBody>
       </p:sp>
     </p:spTree>
   </p:cSld>
+  <p:clrMapOvr>
+    <a:masterClrMapping/>
+  </p:clrMapOvr>
   <p:timing>
     <p:tnLst>
       <p:par>
@@ -2834,14 +4760,14 @@
             <p:seq>
               <p:cTn id="2" nodeType="mainSeq"/>
               <p:prevCondLst>
-                <p:cond delay="0" evt="onPrev">
+                <p:cond evt="onPrev" delay="0">
                   <p:tgtEl>
                     <p:sldTgt/>
                   </p:tgtEl>
                 </p:cond>
               </p:prevCondLst>
               <p:nextCondLst>
-                <p:cond delay="0" evt="onNext">
+                <p:cond evt="onNext" delay="0">
                   <p:tgtEl>
                     <p:sldTgt/>
                   </p:tgtEl>
@@ -3076,5 +5002,7 @@
       </a:bgFillStyleLst>
     </a:fmtScheme>
   </a:themeElements>
+  <a:objectDefaults/>
+  <a:extraClrSchemeLst/>
 </a:theme>
 </file>
</xml_diff>